<commit_message>
small fixes on slides
</commit_message>
<xml_diff>
--- a/exceptions.pptx
+++ b/exceptions.pptx
@@ -9,8 +9,8 @@
   </p:notesMasterIdLst>
   <p:sldIdLst>
     <p:sldId id="256" r:id="rId2"/>
-    <p:sldId id="257" r:id="rId3"/>
-    <p:sldId id="258" r:id="rId4"/>
+    <p:sldId id="258" r:id="rId3"/>
+    <p:sldId id="271" r:id="rId4"/>
     <p:sldId id="259" r:id="rId5"/>
     <p:sldId id="269" r:id="rId6"/>
     <p:sldId id="260" r:id="rId7"/>
@@ -155,82 +155,6 @@
           <inkml:channelProperty channel="T" name="resolution" value="1" units="1/dev"/>
         </inkml:channelProperties>
       </inkml:inkSource>
-      <inkml:timestamp xml:id="ts0" timeString="2016-07-06T19:40:43.078"/>
-    </inkml:context>
-    <inkml:brush xml:id="br0">
-      <inkml:brushProperty name="width" value="0.06667" units="cm"/>
-      <inkml:brushProperty name="height" value="0.06667" units="cm"/>
-      <inkml:brushProperty name="color" value="#ED1C24"/>
-      <inkml:brushProperty name="fitToCurve" value="1"/>
-    </inkml:brush>
-  </inkml:definitions>
-  <inkml:traceGroup>
-    <inkml:annotationXML>
-      <emma:emma xmlns:emma="http://www.w3.org/2003/04/emma" version="1.0">
-        <emma:interpretation id="{520A2B6B-6558-4617-B205-B320C5A61B58}" emma:medium="tactile" emma:mode="ink">
-          <msink:context xmlns:msink="http://schemas.microsoft.com/ink/2010/main" type="inkDrawing" rotatedBoundingBox="17015,10732 23993,11415 23980,11542 17003,10859" shapeName="Other"/>
-        </emma:interpretation>
-      </emma:emma>
-    </inkml:annotationXML>
-    <inkml:trace contextRef="#ctx0" brushRef="#br0">0 31 0,'27'0'15,"29"0"1,-29 0-1,1 0 1,-1 0 0,-27-28-16,28 28 31,0 0-15,-1 0-1,1 0-15,27 0 16,-27 0-16,27 0 15,-28 0-15,1 0 0,27 0 16,28 0-16,-55 0 16,27 28-16,0-28 15,0 0-15,28 0 0,-55 0 16,27 27-16,0-27 16,0 0-16,1 0 15,-29 0-15,28 28 16,1-28-16,-29 0 0,1 0 15,27 0-15,-27 28 16,-1-28-16,1 0 16,0 27-16,-1-27 0,1 0 15,-1 0 1,56 28-16,-55-28 0,27 0 16,-27 0-16,27 0 0,-28 0 15,1 27-15,0-27 16,27 0-16,-27 0 15,-1 0-15,1 0 16,55 56-16,-56-56 16,1 0-16,-1 0 15,1 0-15,0 0 16,-1 0-16,1 0 0,-1 27 16,1-27-1,0 0-15,-1 0 0,1 0 16,-1 0-16,1 0 0,27 28 15,-27-28 1,0 0-16,-1 0 0,1 0 16,-1 0-16,1 0 15,0 0 1,-1 27 0,1-27-1,27 0-15,28 0 16,-28 0-16,0 28 15,28-28-15,-28 0 0,-27 0 16,27 28-16,-27-28 16,-1 0-1,56 0 17,-55 0-32,27 0 15,-27 0-15,27 0 0,55 0 16,-55 0-16,56 0 15,-83 0-15,27 0 16,-28 0-16,1 0 0,0 27 16,-1-27-16,1 0 15,-1 0-15,1 0 16,0 0-16,27 0 16,-28 28-16,56-28 0,-55 0 15,27 0 1,-27 0-16,-1 27 15,1-27-15,0 0 16,-1 0-16,1 0 31,-1 0-31,1 0 0,0 0 16,-1 0 0,1 0-16,27 0 15,-27 0-15,-1 0 16,28 0-16,-27 0 0,55 28 15,-28-28-15,0 0 16,1 0-16,-29 28 16,56-28-16,-55 0 0,-1 0 15,1 0-15,-1 0 16,1 0-16,27 27 0,-27-27 16,-1 0-16,29 0 15,-1 0-15,55 0 0,-27 0 16,-55 0-1,27 0-15,-27 28 0,27-28 16,-28 0-16,1 0 16,0 0-16,-1 0 0,1 0 15,-1 28-15,1-28 16,27 0-16,-27 0 16,27 0-16,28 0 15,-28 0-15,0 0 0,-27 0 16,0 0-1,-1 0 1,1 27 0,-1-27 15,56 0-31,-55 0 16,-1 0-16,1 0 0,0 0 15,-1 0 1,1 0 31,-1 0 31,1 0-47,0 0-15,-56 0 156</inkml:trace>
-  </inkml:traceGroup>
-</inkml:ink>
-</file>
-
-<file path=ppt/ink/ink2.xml><?xml version="1.0" encoding="utf-8"?>
-<inkml:ink xmlns:inkml="http://www.w3.org/2003/InkML">
-  <inkml:definitions>
-    <inkml:context xml:id="ctx0">
-      <inkml:inkSource xml:id="inkSrc0">
-        <inkml:traceFormat>
-          <inkml:channel name="X" type="integer" max="1920" units="cm"/>
-          <inkml:channel name="Y" type="integer" max="1200" units="cm"/>
-          <inkml:channel name="T" type="integer" max="2.14748E9" units="dev"/>
-        </inkml:traceFormat>
-        <inkml:channelProperties>
-          <inkml:channelProperty channel="X" name="resolution" value="37.06564" units="1/cm"/>
-          <inkml:channelProperty channel="Y" name="resolution" value="37.03704" units="1/cm"/>
-          <inkml:channelProperty channel="T" name="resolution" value="1" units="1/dev"/>
-        </inkml:channelProperties>
-      </inkml:inkSource>
-      <inkml:timestamp xml:id="ts0" timeString="2016-07-06T19:40:46.727"/>
-    </inkml:context>
-    <inkml:brush xml:id="br0">
-      <inkml:brushProperty name="width" value="0.06667" units="cm"/>
-      <inkml:brushProperty name="height" value="0.06667" units="cm"/>
-      <inkml:brushProperty name="color" value="#ED1C24"/>
-      <inkml:brushProperty name="fitToCurve" value="1"/>
-    </inkml:brush>
-  </inkml:definitions>
-  <inkml:traceGroup>
-    <inkml:annotationXML>
-      <emma:emma xmlns:emma="http://www.w3.org/2003/04/emma" version="1.0">
-        <emma:interpretation id="{B0DFDCBC-A032-4197-B63D-6394B9ADD7AD}" emma:medium="tactile" emma:mode="ink">
-          <msink:context xmlns:msink="http://schemas.microsoft.com/ink/2010/main" type="inkDrawing" rotatedBoundingBox="17832,11649 23752,10349 23795,10546 17875,11845" shapeName="Other"/>
-        </emma:interpretation>
-      </emma:emma>
-    </inkml:annotationXML>
-    <inkml:trace contextRef="#ctx0" brushRef="#br0">0 1353 0,'27'0'47,"1"0"-32,27 0 1,-27 0-16,-1 0 16,1 0 15,-1 0-15,29 0-16,-1-55 0,28 27 15,27 28-15,-55-27 16,1-1-16,109-27 15,-110 55-15,-27-28 0,0 28 16,54-27 0,-54 27-16,0 0 0,27-28 15,-27 28-15,54-28 16,1 1-16,28 27 16,-56-28-16,55 28 0,1 0 15,-56-55-15,28 27 16,-28 1-16,0-1 15,28 28-15,-55-28 16,-1 28-16,28 0 16,-27-27-16,0 27 15,27-55 1,28 27-16,55 0 0,-28 1 16,1 27-16,-56-55 15,28 55-15,-28 0 16,-28 0-16,1 0 0,27 0 15,-27 0-15,27-28 16,0 28-16,28 0 16,-28 0-16,28-28 0,-28 1 15,1 27-15,54-55 16,-27 27 0,-28 28-16,56 0 0,-56-28 15,28 1-15,-56 27 16,1 0-16,27-28 0,-27 28 15,-1 0-15,1 0 16,-1 0-16,1-27 0,0 27 16,-1 0-16,29 0 15,-29 0-15,1-28 16,55 28-16,-28 0 16,0 0-16,-27 0 15,-1 0-15,1 0 0,-1 0 16,1 0-16,0 0 15,-1 0-15,1 0 16,-1 0 0,1 0-16,0-28 0,-1 28 15,56 0-15,-28 0 0,-27 0 16,27-55 0,0 55-16,56 0 0,-28 0 15,-28-28-15,-28 28 16,1 0-16,0 0 15,-1 0 17,-27-27-17,28 27-15,0 0 16,-28-28 0,27 28-16,-27-27 15,28 27-15,-1 0 16,1 0-1,-28-28-15,28 28 0,27-28 16,0 28-16,-27-27 16,-1-1-16,1 28 31</inkml:trace>
-  </inkml:traceGroup>
-</inkml:ink>
-</file>
-
-<file path=ppt/ink/ink3.xml><?xml version="1.0" encoding="utf-8"?>
-<inkml:ink xmlns:inkml="http://www.w3.org/2003/InkML">
-  <inkml:definitions>
-    <inkml:context xml:id="ctx0">
-      <inkml:inkSource xml:id="inkSrc0">
-        <inkml:traceFormat>
-          <inkml:channel name="X" type="integer" max="1920" units="cm"/>
-          <inkml:channel name="Y" type="integer" max="1200" units="cm"/>
-          <inkml:channel name="T" type="integer" max="2.14748E9" units="dev"/>
-        </inkml:traceFormat>
-        <inkml:channelProperties>
-          <inkml:channelProperty channel="X" name="resolution" value="37.06564" units="1/cm"/>
-          <inkml:channelProperty channel="Y" name="resolution" value="37.03704" units="1/cm"/>
-          <inkml:channelProperty channel="T" name="resolution" value="1" units="1/dev"/>
-        </inkml:channelProperties>
-      </inkml:inkSource>
       <inkml:timestamp xml:id="ts0" timeString="2016-07-06T19:40:23.494"/>
     </inkml:context>
     <inkml:brush xml:id="br0">
@@ -246,7 +170,7 @@
 </inkml:ink>
 </file>
 
-<file path=ppt/ink/ink4.xml><?xml version="1.0" encoding="utf-8"?>
+<file path=ppt/ink/ink2.xml><?xml version="1.0" encoding="utf-8"?>
 <inkml:ink xmlns:inkml="http://www.w3.org/2003/InkML">
   <inkml:definitions>
     <inkml:context xml:id="ctx0">
@@ -359,7 +283,7 @@
           <a:p>
             <a:fld id="{1D12B38D-150E-44F0-AD67-CE4A0E7D73CD}" type="datetimeFigureOut">
               <a:rPr lang="ru-RU" smtClean="0"/>
-              <a:t>07.07.2016</a:t>
+              <a:t>30.10.2016</a:t>
             </a:fld>
             <a:endParaRPr lang="ru-RU"/>
           </a:p>
@@ -758,7 +682,7 @@
           <a:p>
             <a:fld id="{03713669-593F-460C-B61F-C43E6BD11A61}" type="datetimeFigureOut">
               <a:rPr lang="ru-RU" smtClean="0"/>
-              <a:t>07.07.2016</a:t>
+              <a:t>30.10.2016</a:t>
             </a:fld>
             <a:endParaRPr lang="ru-RU"/>
           </a:p>
@@ -928,7 +852,7 @@
           <a:p>
             <a:fld id="{03713669-593F-460C-B61F-C43E6BD11A61}" type="datetimeFigureOut">
               <a:rPr lang="ru-RU" smtClean="0"/>
-              <a:t>07.07.2016</a:t>
+              <a:t>30.10.2016</a:t>
             </a:fld>
             <a:endParaRPr lang="ru-RU"/>
           </a:p>
@@ -1108,7 +1032,7 @@
           <a:p>
             <a:fld id="{03713669-593F-460C-B61F-C43E6BD11A61}" type="datetimeFigureOut">
               <a:rPr lang="ru-RU" smtClean="0"/>
-              <a:t>07.07.2016</a:t>
+              <a:t>30.10.2016</a:t>
             </a:fld>
             <a:endParaRPr lang="ru-RU"/>
           </a:p>
@@ -1278,7 +1202,7 @@
           <a:p>
             <a:fld id="{03713669-593F-460C-B61F-C43E6BD11A61}" type="datetimeFigureOut">
               <a:rPr lang="ru-RU" smtClean="0"/>
-              <a:t>07.07.2016</a:t>
+              <a:t>30.10.2016</a:t>
             </a:fld>
             <a:endParaRPr lang="ru-RU"/>
           </a:p>
@@ -1524,7 +1448,7 @@
           <a:p>
             <a:fld id="{03713669-593F-460C-B61F-C43E6BD11A61}" type="datetimeFigureOut">
               <a:rPr lang="ru-RU" smtClean="0"/>
-              <a:t>07.07.2016</a:t>
+              <a:t>30.10.2016</a:t>
             </a:fld>
             <a:endParaRPr lang="ru-RU"/>
           </a:p>
@@ -1756,7 +1680,7 @@
           <a:p>
             <a:fld id="{03713669-593F-460C-B61F-C43E6BD11A61}" type="datetimeFigureOut">
               <a:rPr lang="ru-RU" smtClean="0"/>
-              <a:t>07.07.2016</a:t>
+              <a:t>30.10.2016</a:t>
             </a:fld>
             <a:endParaRPr lang="ru-RU"/>
           </a:p>
@@ -2123,7 +2047,7 @@
           <a:p>
             <a:fld id="{03713669-593F-460C-B61F-C43E6BD11A61}" type="datetimeFigureOut">
               <a:rPr lang="ru-RU" smtClean="0"/>
-              <a:t>07.07.2016</a:t>
+              <a:t>30.10.2016</a:t>
             </a:fld>
             <a:endParaRPr lang="ru-RU"/>
           </a:p>
@@ -2241,7 +2165,7 @@
           <a:p>
             <a:fld id="{03713669-593F-460C-B61F-C43E6BD11A61}" type="datetimeFigureOut">
               <a:rPr lang="ru-RU" smtClean="0"/>
-              <a:t>07.07.2016</a:t>
+              <a:t>30.10.2016</a:t>
             </a:fld>
             <a:endParaRPr lang="ru-RU"/>
           </a:p>
@@ -2336,7 +2260,7 @@
           <a:p>
             <a:fld id="{03713669-593F-460C-B61F-C43E6BD11A61}" type="datetimeFigureOut">
               <a:rPr lang="ru-RU" smtClean="0"/>
-              <a:t>07.07.2016</a:t>
+              <a:t>30.10.2016</a:t>
             </a:fld>
             <a:endParaRPr lang="ru-RU"/>
           </a:p>
@@ -2613,7 +2537,7 @@
           <a:p>
             <a:fld id="{03713669-593F-460C-B61F-C43E6BD11A61}" type="datetimeFigureOut">
               <a:rPr lang="ru-RU" smtClean="0"/>
-              <a:t>07.07.2016</a:t>
+              <a:t>30.10.2016</a:t>
             </a:fld>
             <a:endParaRPr lang="ru-RU"/>
           </a:p>
@@ -2870,7 +2794,7 @@
           <a:p>
             <a:fld id="{03713669-593F-460C-B61F-C43E6BD11A61}" type="datetimeFigureOut">
               <a:rPr lang="ru-RU" smtClean="0"/>
-              <a:t>07.07.2016</a:t>
+              <a:t>30.10.2016</a:t>
             </a:fld>
             <a:endParaRPr lang="ru-RU"/>
           </a:p>
@@ -3083,7 +3007,7 @@
           <a:p>
             <a:fld id="{03713669-593F-460C-B61F-C43E6BD11A61}" type="datetimeFigureOut">
               <a:rPr lang="ru-RU" smtClean="0"/>
-              <a:t>07.07.2016</a:t>
+              <a:t>30.10.2016</a:t>
             </a:fld>
             <a:endParaRPr lang="ru-RU"/>
           </a:p>
@@ -3540,6 +3464,13 @@
   <p:clrMapOvr>
     <a:masterClrMapping/>
   </p:clrMapOvr>
+  <p:timing>
+    <p:tnLst>
+      <p:par>
+        <p:cTn id="1" dur="indefinite" restart="never" nodeType="tmRoot"/>
+      </p:par>
+    </p:tnLst>
+  </p:timing>
 </p:sld>
 </file>
 
@@ -5453,6 +5384,13 @@
   <p:clrMapOvr>
     <a:masterClrMapping/>
   </p:clrMapOvr>
+  <p:timing>
+    <p:tnLst>
+      <p:par>
+        <p:cTn id="1" dur="indefinite" restart="never" nodeType="tmRoot"/>
+      </p:par>
+    </p:tnLst>
+  </p:timing>
 </p:sld>
 </file>
 
@@ -5754,24 +5692,33 @@
         </p:nvSpPr>
         <p:spPr/>
         <p:txBody>
-          <a:bodyPr/>
+          <a:bodyPr>
+            <a:normAutofit fontScale="90000"/>
+          </a:bodyPr>
           <a:lstStyle/>
           <a:p>
             <a:r>
               <a:rPr lang="en-US" dirty="0" smtClean="0"/>
-              <a:t>#1. </a:t>
-            </a:r>
-            <a:r>
-              <a:rPr lang="ru-RU" dirty="0"/>
-              <a:t>Н</a:t>
+              <a:t>#</a:t>
             </a:r>
             <a:r>
               <a:rPr lang="ru-RU" dirty="0" smtClean="0"/>
-              <a:t>е лови исключения</a:t>
+              <a:t>1</a:t>
             </a:r>
             <a:r>
               <a:rPr lang="en-US" dirty="0" smtClean="0"/>
-              <a:t>*</a:t>
+              <a:t>.</a:t>
+            </a:r>
+            <a:r>
+              <a:rPr lang="ru-RU" dirty="0" smtClean="0"/>
+              <a:t/>
+            </a:r>
+            <a:br>
+              <a:rPr lang="ru-RU" dirty="0" smtClean="0"/>
+            </a:br>
+            <a:r>
+              <a:rPr lang="ru-RU" dirty="0" smtClean="0"/>
+              <a:t>Создай глобальный обработчик исключений</a:t>
             </a:r>
             <a:endParaRPr lang="ru-RU" dirty="0"/>
           </a:p>
@@ -5787,26 +5734,446 @@
             <p:ph idx="1"/>
           </p:nvPr>
         </p:nvSpPr>
-        <p:spPr/>
+        <p:spPr>
+          <a:xfrm>
+            <a:off x="838200" y="1825625"/>
+            <a:ext cx="10515600" cy="4351338"/>
+          </a:xfrm>
+        </p:spPr>
         <p:txBody>
-          <a:bodyPr/>
+          <a:bodyPr>
+            <a:normAutofit fontScale="92500"/>
+          </a:bodyPr>
           <a:lstStyle/>
           <a:p>
             <a:pPr marL="0" indent="0">
               <a:buNone/>
             </a:pPr>
             <a:r>
-              <a:rPr lang="ru-RU" dirty="0" smtClean="0"/>
-              <a:t>* Все исключения из этого правила будут перечислены далее</a:t>
-            </a:r>
-            <a:endParaRPr lang="ru-RU" dirty="0"/>
+              <a:rPr lang="en-US" dirty="0">
+                <a:solidFill>
+                  <a:srgbClr val="0000FF"/>
+                </a:solidFill>
+                <a:highlight>
+                  <a:srgbClr val="FFFFFF"/>
+                </a:highlight>
+                <a:latin typeface="Consolas" panose="020B0609020204030204" pitchFamily="49" charset="0"/>
+              </a:rPr>
+              <a:t>public</a:t>
+            </a:r>
+            <a:r>
+              <a:rPr lang="en-US" dirty="0">
+                <a:solidFill>
+                  <a:srgbClr val="000000"/>
+                </a:solidFill>
+                <a:highlight>
+                  <a:srgbClr val="FFFFFF"/>
+                </a:highlight>
+                <a:latin typeface="Consolas" panose="020B0609020204030204" pitchFamily="49" charset="0"/>
+              </a:rPr>
+              <a:t> </a:t>
+            </a:r>
+            <a:r>
+              <a:rPr lang="en-US" dirty="0">
+                <a:solidFill>
+                  <a:srgbClr val="0000FF"/>
+                </a:solidFill>
+                <a:highlight>
+                  <a:srgbClr val="FFFFFF"/>
+                </a:highlight>
+                <a:latin typeface="Consolas" panose="020B0609020204030204" pitchFamily="49" charset="0"/>
+              </a:rPr>
+              <a:t>void</a:t>
+            </a:r>
+            <a:r>
+              <a:rPr lang="en-US" dirty="0">
+                <a:solidFill>
+                  <a:srgbClr val="000000"/>
+                </a:solidFill>
+                <a:highlight>
+                  <a:srgbClr val="FFFFFF"/>
+                </a:highlight>
+                <a:latin typeface="Consolas" panose="020B0609020204030204" pitchFamily="49" charset="0"/>
+              </a:rPr>
+              <a:t> Main</a:t>
+            </a:r>
+            <a:r>
+              <a:rPr lang="en-US" dirty="0" smtClean="0">
+                <a:solidFill>
+                  <a:srgbClr val="000000"/>
+                </a:solidFill>
+                <a:highlight>
+                  <a:srgbClr val="FFFFFF"/>
+                </a:highlight>
+                <a:latin typeface="Consolas" panose="020B0609020204030204" pitchFamily="49" charset="0"/>
+              </a:rPr>
+              <a:t>() </a:t>
+            </a:r>
+            <a:r>
+              <a:rPr lang="ru-RU" dirty="0" smtClean="0">
+                <a:solidFill>
+                  <a:srgbClr val="000000"/>
+                </a:solidFill>
+                <a:highlight>
+                  <a:srgbClr val="FFFFFF"/>
+                </a:highlight>
+                <a:latin typeface="Consolas" panose="020B0609020204030204" pitchFamily="49" charset="0"/>
+              </a:rPr>
+              <a:t>{</a:t>
+            </a:r>
+            <a:endParaRPr lang="ru-RU" dirty="0">
+              <a:solidFill>
+                <a:srgbClr val="000000"/>
+              </a:solidFill>
+              <a:highlight>
+                <a:srgbClr val="FFFFFF"/>
+              </a:highlight>
+              <a:latin typeface="Consolas" panose="020B0609020204030204" pitchFamily="49" charset="0"/>
+            </a:endParaRPr>
+          </a:p>
+          <a:p>
+            <a:pPr marL="0" indent="0">
+              <a:buNone/>
+            </a:pPr>
+            <a:r>
+              <a:rPr lang="en-US" dirty="0">
+                <a:solidFill>
+                  <a:srgbClr val="000000"/>
+                </a:solidFill>
+                <a:highlight>
+                  <a:srgbClr val="FFFFFF"/>
+                </a:highlight>
+                <a:latin typeface="Consolas" panose="020B0609020204030204" pitchFamily="49" charset="0"/>
+              </a:rPr>
+              <a:t>    </a:t>
+            </a:r>
+            <a:r>
+              <a:rPr lang="en-US" dirty="0" smtClean="0">
+                <a:solidFill>
+                  <a:srgbClr val="0000FF"/>
+                </a:solidFill>
+                <a:highlight>
+                  <a:srgbClr val="FFFFFF"/>
+                </a:highlight>
+                <a:latin typeface="Consolas" panose="020B0609020204030204" pitchFamily="49" charset="0"/>
+              </a:rPr>
+              <a:t>try </a:t>
+            </a:r>
+            <a:r>
+              <a:rPr lang="ru-RU" dirty="0" smtClean="0">
+                <a:solidFill>
+                  <a:srgbClr val="000000"/>
+                </a:solidFill>
+                <a:highlight>
+                  <a:srgbClr val="FFFFFF"/>
+                </a:highlight>
+                <a:latin typeface="Consolas" panose="020B0609020204030204" pitchFamily="49" charset="0"/>
+              </a:rPr>
+              <a:t>{</a:t>
+            </a:r>
+            <a:endParaRPr lang="ru-RU" dirty="0">
+              <a:solidFill>
+                <a:srgbClr val="000000"/>
+              </a:solidFill>
+              <a:highlight>
+                <a:srgbClr val="FFFFFF"/>
+              </a:highlight>
+              <a:latin typeface="Consolas" panose="020B0609020204030204" pitchFamily="49" charset="0"/>
+            </a:endParaRPr>
+          </a:p>
+          <a:p>
+            <a:pPr marL="0" indent="0">
+              <a:buNone/>
+            </a:pPr>
+            <a:r>
+              <a:rPr lang="en-US" dirty="0">
+                <a:solidFill>
+                  <a:srgbClr val="000000"/>
+                </a:solidFill>
+                <a:highlight>
+                  <a:srgbClr val="FFFFFF"/>
+                </a:highlight>
+                <a:latin typeface="Consolas" panose="020B0609020204030204" pitchFamily="49" charset="0"/>
+              </a:rPr>
+              <a:t>        </a:t>
+            </a:r>
+            <a:r>
+              <a:rPr lang="en-US" dirty="0" err="1">
+                <a:solidFill>
+                  <a:srgbClr val="000000"/>
+                </a:solidFill>
+                <a:highlight>
+                  <a:srgbClr val="FFFFFF"/>
+                </a:highlight>
+                <a:latin typeface="Consolas" panose="020B0609020204030204" pitchFamily="49" charset="0"/>
+              </a:rPr>
+              <a:t>DoEverything</a:t>
+            </a:r>
+            <a:r>
+              <a:rPr lang="en-US" dirty="0">
+                <a:solidFill>
+                  <a:srgbClr val="000000"/>
+                </a:solidFill>
+                <a:highlight>
+                  <a:srgbClr val="FFFFFF"/>
+                </a:highlight>
+                <a:latin typeface="Consolas" panose="020B0609020204030204" pitchFamily="49" charset="0"/>
+              </a:rPr>
+              <a:t>();</a:t>
+            </a:r>
+          </a:p>
+          <a:p>
+            <a:pPr marL="0" indent="0">
+              <a:buNone/>
+            </a:pPr>
+            <a:r>
+              <a:rPr lang="ru-RU" dirty="0">
+                <a:solidFill>
+                  <a:srgbClr val="000000"/>
+                </a:solidFill>
+                <a:highlight>
+                  <a:srgbClr val="FFFFFF"/>
+                </a:highlight>
+                <a:latin typeface="Consolas" panose="020B0609020204030204" pitchFamily="49" charset="0"/>
+              </a:rPr>
+              <a:t>    }</a:t>
+            </a:r>
+          </a:p>
+          <a:p>
+            <a:pPr marL="0" indent="0">
+              <a:buNone/>
+            </a:pPr>
+            <a:r>
+              <a:rPr lang="en-US" dirty="0">
+                <a:solidFill>
+                  <a:srgbClr val="000000"/>
+                </a:solidFill>
+                <a:highlight>
+                  <a:srgbClr val="FFFFFF"/>
+                </a:highlight>
+                <a:latin typeface="Consolas" panose="020B0609020204030204" pitchFamily="49" charset="0"/>
+              </a:rPr>
+              <a:t>    </a:t>
+            </a:r>
+            <a:r>
+              <a:rPr lang="en-US" dirty="0">
+                <a:solidFill>
+                  <a:srgbClr val="0000FF"/>
+                </a:solidFill>
+                <a:highlight>
+                  <a:srgbClr val="FFFFFF"/>
+                </a:highlight>
+                <a:latin typeface="Consolas" panose="020B0609020204030204" pitchFamily="49" charset="0"/>
+              </a:rPr>
+              <a:t>catch</a:t>
+            </a:r>
+            <a:r>
+              <a:rPr lang="en-US" dirty="0">
+                <a:solidFill>
+                  <a:srgbClr val="000000"/>
+                </a:solidFill>
+                <a:highlight>
+                  <a:srgbClr val="FFFFFF"/>
+                </a:highlight>
+                <a:latin typeface="Consolas" panose="020B0609020204030204" pitchFamily="49" charset="0"/>
+              </a:rPr>
+              <a:t> (</a:t>
+            </a:r>
+            <a:r>
+              <a:rPr lang="en-US" dirty="0">
+                <a:solidFill>
+                  <a:srgbClr val="2B91AF"/>
+                </a:solidFill>
+                <a:highlight>
+                  <a:srgbClr val="FFFFFF"/>
+                </a:highlight>
+                <a:latin typeface="Consolas" panose="020B0609020204030204" pitchFamily="49" charset="0"/>
+              </a:rPr>
+              <a:t>Exception</a:t>
+            </a:r>
+            <a:r>
+              <a:rPr lang="en-US" dirty="0">
+                <a:solidFill>
+                  <a:srgbClr val="000000"/>
+                </a:solidFill>
+                <a:highlight>
+                  <a:srgbClr val="FFFFFF"/>
+                </a:highlight>
+                <a:latin typeface="Consolas" panose="020B0609020204030204" pitchFamily="49" charset="0"/>
+              </a:rPr>
+              <a:t> e</a:t>
+            </a:r>
+            <a:r>
+              <a:rPr lang="en-US" dirty="0" smtClean="0">
+                <a:solidFill>
+                  <a:srgbClr val="000000"/>
+                </a:solidFill>
+                <a:highlight>
+                  <a:srgbClr val="FFFFFF"/>
+                </a:highlight>
+                <a:latin typeface="Consolas" panose="020B0609020204030204" pitchFamily="49" charset="0"/>
+              </a:rPr>
+              <a:t>)</a:t>
+            </a:r>
+            <a:r>
+              <a:rPr lang="ru-RU" dirty="0" smtClean="0">
+                <a:solidFill>
+                  <a:srgbClr val="000000"/>
+                </a:solidFill>
+                <a:highlight>
+                  <a:srgbClr val="FFFFFF"/>
+                </a:highlight>
+                <a:latin typeface="Consolas" panose="020B0609020204030204" pitchFamily="49" charset="0"/>
+              </a:rPr>
+              <a:t>{</a:t>
+            </a:r>
+            <a:endParaRPr lang="ru-RU" dirty="0">
+              <a:solidFill>
+                <a:srgbClr val="000000"/>
+              </a:solidFill>
+              <a:highlight>
+                <a:srgbClr val="FFFFFF"/>
+              </a:highlight>
+              <a:latin typeface="Consolas" panose="020B0609020204030204" pitchFamily="49" charset="0"/>
+            </a:endParaRPr>
+          </a:p>
+          <a:p>
+            <a:pPr marL="0" indent="0">
+              <a:buNone/>
+            </a:pPr>
+            <a:r>
+              <a:rPr lang="ru-RU" dirty="0">
+                <a:solidFill>
+                  <a:srgbClr val="000000"/>
+                </a:solidFill>
+                <a:highlight>
+                  <a:srgbClr val="FFFFFF"/>
+                </a:highlight>
+                <a:latin typeface="Consolas" panose="020B0609020204030204" pitchFamily="49" charset="0"/>
+              </a:rPr>
+              <a:t>        </a:t>
+            </a:r>
+            <a:r>
+              <a:rPr lang="ru-RU" dirty="0">
+                <a:solidFill>
+                  <a:srgbClr val="008000"/>
+                </a:solidFill>
+                <a:highlight>
+                  <a:srgbClr val="FFFFFF"/>
+                </a:highlight>
+                <a:latin typeface="Consolas" panose="020B0609020204030204" pitchFamily="49" charset="0"/>
+              </a:rPr>
+              <a:t>// залогировать e для отладки и расследований</a:t>
+            </a:r>
+            <a:endParaRPr lang="ru-RU" dirty="0">
+              <a:solidFill>
+                <a:srgbClr val="000000"/>
+              </a:solidFill>
+              <a:highlight>
+                <a:srgbClr val="FFFFFF"/>
+              </a:highlight>
+              <a:latin typeface="Consolas" panose="020B0609020204030204" pitchFamily="49" charset="0"/>
+            </a:endParaRPr>
+          </a:p>
+          <a:p>
+            <a:pPr marL="0" indent="0">
+              <a:buNone/>
+            </a:pPr>
+            <a:r>
+              <a:rPr lang="ru-RU" dirty="0">
+                <a:solidFill>
+                  <a:srgbClr val="000000"/>
+                </a:solidFill>
+                <a:highlight>
+                  <a:srgbClr val="FFFFFF"/>
+                </a:highlight>
+                <a:latin typeface="Consolas" panose="020B0609020204030204" pitchFamily="49" charset="0"/>
+              </a:rPr>
+              <a:t>        </a:t>
+            </a:r>
+            <a:r>
+              <a:rPr lang="ru-RU" dirty="0">
+                <a:solidFill>
+                  <a:srgbClr val="008000"/>
+                </a:solidFill>
+                <a:highlight>
+                  <a:srgbClr val="FFFFFF"/>
+                </a:highlight>
+                <a:latin typeface="Consolas" panose="020B0609020204030204" pitchFamily="49" charset="0"/>
+              </a:rPr>
+              <a:t>// показать грустного котёнка пользователю</a:t>
+            </a:r>
+            <a:endParaRPr lang="ru-RU" dirty="0">
+              <a:solidFill>
+                <a:srgbClr val="000000"/>
+              </a:solidFill>
+              <a:highlight>
+                <a:srgbClr val="FFFFFF"/>
+              </a:highlight>
+              <a:latin typeface="Consolas" panose="020B0609020204030204" pitchFamily="49" charset="0"/>
+            </a:endParaRPr>
+          </a:p>
+          <a:p>
+            <a:pPr marL="0" indent="0">
+              <a:buNone/>
+            </a:pPr>
+            <a:r>
+              <a:rPr lang="en-US" dirty="0" smtClean="0">
+                <a:solidFill>
+                  <a:srgbClr val="000000"/>
+                </a:solidFill>
+                <a:highlight>
+                  <a:srgbClr val="FFFFFF"/>
+                </a:highlight>
+                <a:latin typeface="Consolas" panose="020B0609020204030204" pitchFamily="49" charset="0"/>
+              </a:rPr>
+              <a:t>    </a:t>
+            </a:r>
+            <a:r>
+              <a:rPr lang="ru-RU" dirty="0" smtClean="0">
+                <a:solidFill>
+                  <a:srgbClr val="000000"/>
+                </a:solidFill>
+                <a:highlight>
+                  <a:srgbClr val="FFFFFF"/>
+                </a:highlight>
+                <a:latin typeface="Consolas" panose="020B0609020204030204" pitchFamily="49" charset="0"/>
+              </a:rPr>
+              <a:t>}</a:t>
+            </a:r>
+            <a:endParaRPr lang="ru-RU" dirty="0">
+              <a:solidFill>
+                <a:srgbClr val="000000"/>
+              </a:solidFill>
+              <a:highlight>
+                <a:srgbClr val="FFFFFF"/>
+              </a:highlight>
+              <a:latin typeface="Consolas" panose="020B0609020204030204" pitchFamily="49" charset="0"/>
+            </a:endParaRPr>
+          </a:p>
+          <a:p>
+            <a:pPr marL="0" indent="0">
+              <a:buNone/>
+            </a:pPr>
+            <a:r>
+              <a:rPr lang="ru-RU" dirty="0">
+                <a:solidFill>
+                  <a:srgbClr val="000000"/>
+                </a:solidFill>
+                <a:highlight>
+                  <a:srgbClr val="FFFFFF"/>
+                </a:highlight>
+                <a:latin typeface="Consolas" panose="020B0609020204030204" pitchFamily="49" charset="0"/>
+              </a:rPr>
+              <a:t>}</a:t>
+            </a:r>
           </a:p>
         </p:txBody>
       </p:sp>
     </p:spTree>
     <p:extLst>
       <p:ext uri="{BB962C8B-B14F-4D97-AF65-F5344CB8AC3E}">
-        <p14:creationId xmlns:p14="http://schemas.microsoft.com/office/powerpoint/2010/main" val="1657329013"/>
+        <p14:creationId xmlns:p14="http://schemas.microsoft.com/office/powerpoint/2010/main" val="1447770033"/>
       </p:ext>
     </p:extLst>
   </p:cSld>
@@ -5852,25 +6219,39 @@
         </p:nvSpPr>
         <p:spPr/>
         <p:txBody>
-          <a:bodyPr>
-            <a:normAutofit fontScale="90000"/>
-          </a:bodyPr>
+          <a:bodyPr/>
           <a:lstStyle/>
           <a:p>
             <a:r>
               <a:rPr lang="en-US" dirty="0" smtClean="0"/>
-              <a:t>#2.</a:t>
+              <a:t>#</a:t>
             </a:r>
             <a:r>
               <a:rPr lang="ru-RU" dirty="0" smtClean="0"/>
-              <a:t/>
+              <a:t>2</a:t>
+            </a:r>
+            <a:r>
+              <a:rPr lang="en-US" dirty="0" smtClean="0"/>
+              <a:t>. </a:t>
             </a:r>
             <a:br>
+              <a:rPr lang="en-US" dirty="0" smtClean="0"/>
+            </a:br>
+            <a:r>
               <a:rPr lang="ru-RU" dirty="0" smtClean="0"/>
-            </a:br>
+              <a:t>И больше нигде </a:t>
+            </a:r>
             <a:r>
               <a:rPr lang="ru-RU" dirty="0" smtClean="0"/>
-              <a:t>Создай глобальный обработчик исключений</a:t>
+              <a:t>не </a:t>
+            </a:r>
+            <a:r>
+              <a:rPr lang="ru-RU" dirty="0" smtClean="0"/>
+              <a:t>лови исключения</a:t>
+            </a:r>
+            <a:r>
+              <a:rPr lang="en-US" dirty="0" smtClean="0"/>
+              <a:t>*</a:t>
             </a:r>
             <a:endParaRPr lang="ru-RU" dirty="0"/>
           </a:p>
@@ -5888,13 +6269,13 @@
         </p:nvSpPr>
         <p:spPr>
           <a:xfrm>
-            <a:off x="838200" y="1825625"/>
-            <a:ext cx="10515600" cy="4351338"/>
+            <a:off x="912337" y="6389860"/>
+            <a:ext cx="10515600" cy="468140"/>
           </a:xfrm>
         </p:spPr>
         <p:txBody>
           <a:bodyPr>
-            <a:normAutofit fontScale="92500"/>
+            <a:normAutofit lnSpcReduction="10000"/>
           </a:bodyPr>
           <a:lstStyle/>
           <a:p>
@@ -5902,8 +6283,530 @@
               <a:buNone/>
             </a:pPr>
             <a:r>
+              <a:rPr lang="ru-RU" dirty="0" smtClean="0"/>
+              <a:t>* Все исключения из этого правила будут перечислены далее</a:t>
+            </a:r>
+            <a:endParaRPr lang="ru-RU" dirty="0"/>
+          </a:p>
+        </p:txBody>
+      </p:sp>
+      <p:sp>
+        <p:nvSpPr>
+          <p:cNvPr id="5" name="Объект 2"/>
+          <p:cNvSpPr txBox="1">
+            <a:spLocks/>
+          </p:cNvSpPr>
+          <p:nvPr/>
+        </p:nvSpPr>
+        <p:spPr>
+          <a:xfrm>
+            <a:off x="990600" y="1879168"/>
+            <a:ext cx="10515600" cy="4351338"/>
+          </a:xfrm>
+          <a:prstGeom prst="rect">
+            <a:avLst/>
+          </a:prstGeom>
+        </p:spPr>
+        <p:txBody>
+          <a:bodyPr vert="horz" lIns="91440" tIns="45720" rIns="91440" bIns="45720" rtlCol="0">
+            <a:normAutofit lnSpcReduction="10000"/>
+          </a:bodyPr>
+          <a:lstStyle>
+            <a:lvl1pPr marL="228600" indent="-228600" algn="l" defTabSz="914400" rtl="0" eaLnBrk="1" latinLnBrk="0" hangingPunct="1">
+              <a:lnSpc>
+                <a:spcPct val="90000"/>
+              </a:lnSpc>
+              <a:spcBef>
+                <a:spcPts val="1000"/>
+              </a:spcBef>
+              <a:buFont typeface="Arial" panose="020B0604020202020204" pitchFamily="34" charset="0"/>
+              <a:buChar char="•"/>
+              <a:defRPr sz="2800" kern="1200">
+                <a:solidFill>
+                  <a:schemeClr val="tx1"/>
+                </a:solidFill>
+                <a:latin typeface="+mn-lt"/>
+                <a:ea typeface="+mn-ea"/>
+                <a:cs typeface="+mn-cs"/>
+              </a:defRPr>
+            </a:lvl1pPr>
+            <a:lvl2pPr marL="685800" indent="-228600" algn="l" defTabSz="914400" rtl="0" eaLnBrk="1" latinLnBrk="0" hangingPunct="1">
+              <a:lnSpc>
+                <a:spcPct val="90000"/>
+              </a:lnSpc>
+              <a:spcBef>
+                <a:spcPts val="500"/>
+              </a:spcBef>
+              <a:buFont typeface="Arial" panose="020B0604020202020204" pitchFamily="34" charset="0"/>
+              <a:buChar char="•"/>
+              <a:defRPr sz="2400" kern="1200">
+                <a:solidFill>
+                  <a:schemeClr val="tx1"/>
+                </a:solidFill>
+                <a:latin typeface="+mn-lt"/>
+                <a:ea typeface="+mn-ea"/>
+                <a:cs typeface="+mn-cs"/>
+              </a:defRPr>
+            </a:lvl2pPr>
+            <a:lvl3pPr marL="1143000" indent="-228600" algn="l" defTabSz="914400" rtl="0" eaLnBrk="1" latinLnBrk="0" hangingPunct="1">
+              <a:lnSpc>
+                <a:spcPct val="90000"/>
+              </a:lnSpc>
+              <a:spcBef>
+                <a:spcPts val="500"/>
+              </a:spcBef>
+              <a:buFont typeface="Arial" panose="020B0604020202020204" pitchFamily="34" charset="0"/>
+              <a:buChar char="•"/>
+              <a:defRPr sz="2000" kern="1200">
+                <a:solidFill>
+                  <a:schemeClr val="tx1"/>
+                </a:solidFill>
+                <a:latin typeface="+mn-lt"/>
+                <a:ea typeface="+mn-ea"/>
+                <a:cs typeface="+mn-cs"/>
+              </a:defRPr>
+            </a:lvl3pPr>
+            <a:lvl4pPr marL="1600200" indent="-228600" algn="l" defTabSz="914400" rtl="0" eaLnBrk="1" latinLnBrk="0" hangingPunct="1">
+              <a:lnSpc>
+                <a:spcPct val="90000"/>
+              </a:lnSpc>
+              <a:spcBef>
+                <a:spcPts val="500"/>
+              </a:spcBef>
+              <a:buFont typeface="Arial" panose="020B0604020202020204" pitchFamily="34" charset="0"/>
+              <a:buChar char="•"/>
+              <a:defRPr sz="1800" kern="1200">
+                <a:solidFill>
+                  <a:schemeClr val="tx1"/>
+                </a:solidFill>
+                <a:latin typeface="+mn-lt"/>
+                <a:ea typeface="+mn-ea"/>
+                <a:cs typeface="+mn-cs"/>
+              </a:defRPr>
+            </a:lvl4pPr>
+            <a:lvl5pPr marL="2057400" indent="-228600" algn="l" defTabSz="914400" rtl="0" eaLnBrk="1" latinLnBrk="0" hangingPunct="1">
+              <a:lnSpc>
+                <a:spcPct val="90000"/>
+              </a:lnSpc>
+              <a:spcBef>
+                <a:spcPts val="500"/>
+              </a:spcBef>
+              <a:buFont typeface="Arial" panose="020B0604020202020204" pitchFamily="34" charset="0"/>
+              <a:buChar char="•"/>
+              <a:defRPr sz="1800" kern="1200">
+                <a:solidFill>
+                  <a:schemeClr val="tx1"/>
+                </a:solidFill>
+                <a:latin typeface="+mn-lt"/>
+                <a:ea typeface="+mn-ea"/>
+                <a:cs typeface="+mn-cs"/>
+              </a:defRPr>
+            </a:lvl5pPr>
+            <a:lvl6pPr marL="2514600" indent="-228600" algn="l" defTabSz="914400" rtl="0" eaLnBrk="1" latinLnBrk="0" hangingPunct="1">
+              <a:lnSpc>
+                <a:spcPct val="90000"/>
+              </a:lnSpc>
+              <a:spcBef>
+                <a:spcPts val="500"/>
+              </a:spcBef>
+              <a:buFont typeface="Arial" panose="020B0604020202020204" pitchFamily="34" charset="0"/>
+              <a:buChar char="•"/>
+              <a:defRPr sz="1800" kern="1200">
+                <a:solidFill>
+                  <a:schemeClr val="tx1"/>
+                </a:solidFill>
+                <a:latin typeface="+mn-lt"/>
+                <a:ea typeface="+mn-ea"/>
+                <a:cs typeface="+mn-cs"/>
+              </a:defRPr>
+            </a:lvl6pPr>
+            <a:lvl7pPr marL="2971800" indent="-228600" algn="l" defTabSz="914400" rtl="0" eaLnBrk="1" latinLnBrk="0" hangingPunct="1">
+              <a:lnSpc>
+                <a:spcPct val="90000"/>
+              </a:lnSpc>
+              <a:spcBef>
+                <a:spcPts val="500"/>
+              </a:spcBef>
+              <a:buFont typeface="Arial" panose="020B0604020202020204" pitchFamily="34" charset="0"/>
+              <a:buChar char="•"/>
+              <a:defRPr sz="1800" kern="1200">
+                <a:solidFill>
+                  <a:schemeClr val="tx1"/>
+                </a:solidFill>
+                <a:latin typeface="+mn-lt"/>
+                <a:ea typeface="+mn-ea"/>
+                <a:cs typeface="+mn-cs"/>
+              </a:defRPr>
+            </a:lvl7pPr>
+            <a:lvl8pPr marL="3429000" indent="-228600" algn="l" defTabSz="914400" rtl="0" eaLnBrk="1" latinLnBrk="0" hangingPunct="1">
+              <a:lnSpc>
+                <a:spcPct val="90000"/>
+              </a:lnSpc>
+              <a:spcBef>
+                <a:spcPts val="500"/>
+              </a:spcBef>
+              <a:buFont typeface="Arial" panose="020B0604020202020204" pitchFamily="34" charset="0"/>
+              <a:buChar char="•"/>
+              <a:defRPr sz="1800" kern="1200">
+                <a:solidFill>
+                  <a:schemeClr val="tx1"/>
+                </a:solidFill>
+                <a:latin typeface="+mn-lt"/>
+                <a:ea typeface="+mn-ea"/>
+                <a:cs typeface="+mn-cs"/>
+              </a:defRPr>
+            </a:lvl8pPr>
+            <a:lvl9pPr marL="3886200" indent="-228600" algn="l" defTabSz="914400" rtl="0" eaLnBrk="1" latinLnBrk="0" hangingPunct="1">
+              <a:lnSpc>
+                <a:spcPct val="90000"/>
+              </a:lnSpc>
+              <a:spcBef>
+                <a:spcPts val="500"/>
+              </a:spcBef>
+              <a:buFont typeface="Arial" panose="020B0604020202020204" pitchFamily="34" charset="0"/>
+              <a:buChar char="•"/>
+              <a:defRPr sz="1800" kern="1200">
+                <a:solidFill>
+                  <a:schemeClr val="tx1"/>
+                </a:solidFill>
+                <a:latin typeface="+mn-lt"/>
+                <a:ea typeface="+mn-ea"/>
+                <a:cs typeface="+mn-cs"/>
+              </a:defRPr>
+            </a:lvl9pPr>
+          </a:lstStyle>
+          <a:p>
+            <a:pPr marL="0" indent="0">
+              <a:buFont typeface="Arial" panose="020B0604020202020204" pitchFamily="34" charset="0"/>
+              <a:buNone/>
+            </a:pPr>
+            <a:r>
+              <a:rPr lang="en-US" dirty="0" smtClean="0">
+                <a:solidFill>
+                  <a:srgbClr val="0000FF"/>
+                </a:solidFill>
+                <a:highlight>
+                  <a:srgbClr val="FFFFFF"/>
+                </a:highlight>
+                <a:latin typeface="Consolas" panose="020B0609020204030204" pitchFamily="49" charset="0"/>
+              </a:rPr>
+              <a:t>public</a:t>
+            </a:r>
+            <a:r>
+              <a:rPr lang="en-US" dirty="0" smtClean="0">
+                <a:solidFill>
+                  <a:srgbClr val="000000"/>
+                </a:solidFill>
+                <a:highlight>
+                  <a:srgbClr val="FFFFFF"/>
+                </a:highlight>
+                <a:latin typeface="Consolas" panose="020B0609020204030204" pitchFamily="49" charset="0"/>
+              </a:rPr>
+              <a:t> </a:t>
+            </a:r>
+            <a:r>
+              <a:rPr lang="en-US" dirty="0" smtClean="0">
+                <a:solidFill>
+                  <a:srgbClr val="0000FF"/>
+                </a:solidFill>
+                <a:highlight>
+                  <a:srgbClr val="FFFFFF"/>
+                </a:highlight>
+                <a:latin typeface="Consolas" panose="020B0609020204030204" pitchFamily="49" charset="0"/>
+              </a:rPr>
+              <a:t>void</a:t>
+            </a:r>
+            <a:r>
+              <a:rPr lang="en-US" dirty="0" smtClean="0">
+                <a:solidFill>
+                  <a:srgbClr val="000000"/>
+                </a:solidFill>
+                <a:highlight>
+                  <a:srgbClr val="FFFFFF"/>
+                </a:highlight>
+                <a:latin typeface="Consolas" panose="020B0609020204030204" pitchFamily="49" charset="0"/>
+              </a:rPr>
+              <a:t> Main() </a:t>
+            </a:r>
+            <a:r>
+              <a:rPr lang="ru-RU" dirty="0" smtClean="0">
+                <a:solidFill>
+                  <a:srgbClr val="000000"/>
+                </a:solidFill>
+                <a:highlight>
+                  <a:srgbClr val="FFFFFF"/>
+                </a:highlight>
+                <a:latin typeface="Consolas" panose="020B0609020204030204" pitchFamily="49" charset="0"/>
+              </a:rPr>
+              <a:t>{</a:t>
+            </a:r>
+          </a:p>
+          <a:p>
+            <a:pPr marL="0" indent="0">
+              <a:buFont typeface="Arial" panose="020B0604020202020204" pitchFamily="34" charset="0"/>
+              <a:buNone/>
+            </a:pPr>
+            <a:r>
+              <a:rPr lang="en-US" dirty="0" smtClean="0">
+                <a:solidFill>
+                  <a:srgbClr val="000000"/>
+                </a:solidFill>
+                <a:highlight>
+                  <a:srgbClr val="FFFFFF"/>
+                </a:highlight>
+                <a:latin typeface="Consolas" panose="020B0609020204030204" pitchFamily="49" charset="0"/>
+              </a:rPr>
+              <a:t>    </a:t>
+            </a:r>
+            <a:r>
+              <a:rPr lang="en-US" dirty="0" smtClean="0">
+                <a:solidFill>
+                  <a:srgbClr val="0000FF"/>
+                </a:solidFill>
+                <a:highlight>
+                  <a:srgbClr val="FFFFFF"/>
+                </a:highlight>
+                <a:latin typeface="Consolas" panose="020B0609020204030204" pitchFamily="49" charset="0"/>
+              </a:rPr>
+              <a:t>try </a:t>
+            </a:r>
+            <a:r>
+              <a:rPr lang="ru-RU" dirty="0" smtClean="0">
+                <a:solidFill>
+                  <a:srgbClr val="000000"/>
+                </a:solidFill>
+                <a:highlight>
+                  <a:srgbClr val="FFFFFF"/>
+                </a:highlight>
+                <a:latin typeface="Consolas" panose="020B0609020204030204" pitchFamily="49" charset="0"/>
+              </a:rPr>
+              <a:t>{</a:t>
+            </a:r>
+          </a:p>
+          <a:p>
+            <a:pPr marL="0" indent="0">
+              <a:buFont typeface="Arial" panose="020B0604020202020204" pitchFamily="34" charset="0"/>
+              <a:buNone/>
+            </a:pPr>
+            <a:r>
+              <a:rPr lang="en-US" dirty="0" smtClean="0">
+                <a:solidFill>
+                  <a:srgbClr val="000000"/>
+                </a:solidFill>
+                <a:highlight>
+                  <a:srgbClr val="FFFFFF"/>
+                </a:highlight>
+                <a:latin typeface="Consolas" panose="020B0609020204030204" pitchFamily="49" charset="0"/>
+              </a:rPr>
+              <a:t>        </a:t>
+            </a:r>
+            <a:r>
+              <a:rPr lang="en-US" dirty="0" err="1" smtClean="0">
+                <a:solidFill>
+                  <a:srgbClr val="000000"/>
+                </a:solidFill>
+                <a:highlight>
+                  <a:srgbClr val="FFFFFF"/>
+                </a:highlight>
+                <a:latin typeface="Consolas" panose="020B0609020204030204" pitchFamily="49" charset="0"/>
+              </a:rPr>
+              <a:t>DoEverything</a:t>
+            </a:r>
+            <a:r>
+              <a:rPr lang="en-US" dirty="0" smtClean="0">
+                <a:solidFill>
+                  <a:srgbClr val="000000"/>
+                </a:solidFill>
+                <a:highlight>
+                  <a:srgbClr val="FFFFFF"/>
+                </a:highlight>
+                <a:latin typeface="Consolas" panose="020B0609020204030204" pitchFamily="49" charset="0"/>
+              </a:rPr>
+              <a:t>();</a:t>
+            </a:r>
+          </a:p>
+          <a:p>
+            <a:pPr marL="0" indent="0">
+              <a:buFont typeface="Arial" panose="020B0604020202020204" pitchFamily="34" charset="0"/>
+              <a:buNone/>
+            </a:pPr>
+            <a:r>
+              <a:rPr lang="ru-RU" dirty="0" smtClean="0">
+                <a:solidFill>
+                  <a:srgbClr val="000000"/>
+                </a:solidFill>
+                <a:highlight>
+                  <a:srgbClr val="FFFFFF"/>
+                </a:highlight>
+                <a:latin typeface="Consolas" panose="020B0609020204030204" pitchFamily="49" charset="0"/>
+              </a:rPr>
+              <a:t>    }</a:t>
+            </a:r>
+          </a:p>
+          <a:p>
+            <a:pPr marL="0" indent="0">
+              <a:buFont typeface="Arial" panose="020B0604020202020204" pitchFamily="34" charset="0"/>
+              <a:buNone/>
+            </a:pPr>
+            <a:r>
+              <a:rPr lang="en-US" dirty="0" smtClean="0">
+                <a:solidFill>
+                  <a:srgbClr val="000000"/>
+                </a:solidFill>
+                <a:highlight>
+                  <a:srgbClr val="FFFFFF"/>
+                </a:highlight>
+                <a:latin typeface="Consolas" panose="020B0609020204030204" pitchFamily="49" charset="0"/>
+              </a:rPr>
+              <a:t>    </a:t>
+            </a:r>
+            <a:r>
+              <a:rPr lang="en-US" dirty="0" smtClean="0">
+                <a:solidFill>
+                  <a:srgbClr val="0000FF"/>
+                </a:solidFill>
+                <a:highlight>
+                  <a:srgbClr val="FFFFFF"/>
+                </a:highlight>
+                <a:latin typeface="Consolas" panose="020B0609020204030204" pitchFamily="49" charset="0"/>
+              </a:rPr>
+              <a:t>catch</a:t>
+            </a:r>
+            <a:r>
+              <a:rPr lang="en-US" dirty="0" smtClean="0">
+                <a:solidFill>
+                  <a:srgbClr val="000000"/>
+                </a:solidFill>
+                <a:highlight>
+                  <a:srgbClr val="FFFFFF"/>
+                </a:highlight>
+                <a:latin typeface="Consolas" panose="020B0609020204030204" pitchFamily="49" charset="0"/>
+              </a:rPr>
+              <a:t> (</a:t>
+            </a:r>
+            <a:r>
+              <a:rPr lang="en-US" dirty="0" smtClean="0">
+                <a:solidFill>
+                  <a:srgbClr val="2B91AF"/>
+                </a:solidFill>
+                <a:highlight>
+                  <a:srgbClr val="FFFFFF"/>
+                </a:highlight>
+                <a:latin typeface="Consolas" panose="020B0609020204030204" pitchFamily="49" charset="0"/>
+              </a:rPr>
+              <a:t>Exception</a:t>
+            </a:r>
+            <a:r>
+              <a:rPr lang="en-US" dirty="0" smtClean="0">
+                <a:solidFill>
+                  <a:srgbClr val="000000"/>
+                </a:solidFill>
+                <a:highlight>
+                  <a:srgbClr val="FFFFFF"/>
+                </a:highlight>
+                <a:latin typeface="Consolas" panose="020B0609020204030204" pitchFamily="49" charset="0"/>
+              </a:rPr>
+              <a:t> e)</a:t>
+            </a:r>
+            <a:r>
+              <a:rPr lang="ru-RU" dirty="0" smtClean="0">
+                <a:solidFill>
+                  <a:srgbClr val="000000"/>
+                </a:solidFill>
+                <a:highlight>
+                  <a:srgbClr val="FFFFFF"/>
+                </a:highlight>
+                <a:latin typeface="Consolas" panose="020B0609020204030204" pitchFamily="49" charset="0"/>
+              </a:rPr>
+              <a:t>{</a:t>
+            </a:r>
+          </a:p>
+          <a:p>
+            <a:pPr marL="0" indent="0">
+              <a:buFont typeface="Arial" panose="020B0604020202020204" pitchFamily="34" charset="0"/>
+              <a:buNone/>
+            </a:pPr>
+            <a:r>
+              <a:rPr lang="ru-RU" dirty="0">
+                <a:solidFill>
+                  <a:srgbClr val="000000"/>
+                </a:solidFill>
+                <a:highlight>
+                  <a:srgbClr val="FFFFFF"/>
+                </a:highlight>
+                <a:latin typeface="Consolas" panose="020B0609020204030204" pitchFamily="49" charset="0"/>
+              </a:rPr>
+              <a:t>	</a:t>
+            </a:r>
+            <a:r>
+              <a:rPr lang="ru-RU" dirty="0" smtClean="0">
+                <a:solidFill>
+                  <a:srgbClr val="000000"/>
+                </a:solidFill>
+                <a:highlight>
+                  <a:srgbClr val="FFFFFF"/>
+                </a:highlight>
+                <a:latin typeface="Consolas" panose="020B0609020204030204" pitchFamily="49" charset="0"/>
+              </a:rPr>
+              <a:t>	</a:t>
+            </a:r>
+            <a:r>
+              <a:rPr lang="en-US" dirty="0" err="1" smtClean="0">
+                <a:solidFill>
+                  <a:srgbClr val="000000"/>
+                </a:solidFill>
+                <a:highlight>
+                  <a:srgbClr val="FFFFFF"/>
+                </a:highlight>
+                <a:latin typeface="Consolas" panose="020B0609020204030204" pitchFamily="49" charset="0"/>
+              </a:rPr>
+              <a:t>logger.LogError</a:t>
+            </a:r>
+            <a:r>
+              <a:rPr lang="en-US" dirty="0" smtClean="0">
+                <a:solidFill>
+                  <a:srgbClr val="000000"/>
+                </a:solidFill>
+                <a:highlight>
+                  <a:srgbClr val="FFFFFF"/>
+                </a:highlight>
+                <a:latin typeface="Consolas" panose="020B0609020204030204" pitchFamily="49" charset="0"/>
+              </a:rPr>
+              <a:t>(e);</a:t>
+            </a:r>
+          </a:p>
+          <a:p>
+            <a:pPr marL="0" indent="0">
+              <a:buFont typeface="Arial" panose="020B0604020202020204" pitchFamily="34" charset="0"/>
+              <a:buNone/>
+            </a:pPr>
+            <a:r>
               <a:rPr lang="en-US" dirty="0">
                 <a:solidFill>
+                  <a:srgbClr val="000000"/>
+                </a:solidFill>
+                <a:highlight>
+                  <a:srgbClr val="FFFFFF"/>
+                </a:highlight>
+                <a:latin typeface="Consolas" panose="020B0609020204030204" pitchFamily="49" charset="0"/>
+              </a:rPr>
+              <a:t>	</a:t>
+            </a:r>
+            <a:r>
+              <a:rPr lang="en-US" dirty="0" smtClean="0">
+                <a:solidFill>
+                  <a:srgbClr val="000000"/>
+                </a:solidFill>
+                <a:highlight>
+                  <a:srgbClr val="FFFFFF"/>
+                </a:highlight>
+                <a:latin typeface="Consolas" panose="020B0609020204030204" pitchFamily="49" charset="0"/>
+              </a:rPr>
+              <a:t>	</a:t>
+            </a:r>
+            <a:r>
+              <a:rPr lang="en-US" dirty="0">
+                <a:solidFill>
                   <a:srgbClr val="0000FF"/>
                 </a:solidFill>
                 <a:highlight>
@@ -5911,43 +6814,7 @@
                 </a:highlight>
                 <a:latin typeface="Consolas" panose="020B0609020204030204" pitchFamily="49" charset="0"/>
               </a:rPr>
-              <a:t>public</a:t>
-            </a:r>
-            <a:r>
-              <a:rPr lang="en-US" dirty="0">
-                <a:solidFill>
-                  <a:srgbClr val="000000"/>
-                </a:solidFill>
-                <a:highlight>
-                  <a:srgbClr val="FFFFFF"/>
-                </a:highlight>
-                <a:latin typeface="Consolas" panose="020B0609020204030204" pitchFamily="49" charset="0"/>
-              </a:rPr>
-              <a:t> </a:t>
-            </a:r>
-            <a:r>
-              <a:rPr lang="en-US" dirty="0">
-                <a:solidFill>
-                  <a:srgbClr val="0000FF"/>
-                </a:solidFill>
-                <a:highlight>
-                  <a:srgbClr val="FFFFFF"/>
-                </a:highlight>
-                <a:latin typeface="Consolas" panose="020B0609020204030204" pitchFamily="49" charset="0"/>
-              </a:rPr>
-              <a:t>void</a:t>
-            </a:r>
-            <a:r>
-              <a:rPr lang="en-US" dirty="0">
-                <a:solidFill>
-                  <a:srgbClr val="000000"/>
-                </a:solidFill>
-                <a:highlight>
-                  <a:srgbClr val="FFFFFF"/>
-                </a:highlight>
-                <a:latin typeface="Consolas" panose="020B0609020204030204" pitchFamily="49" charset="0"/>
-              </a:rPr>
-              <a:t> Main</a:t>
+              <a:t>throw</a:t>
             </a:r>
             <a:r>
               <a:rPr lang="en-US" dirty="0" smtClean="0">
@@ -5959,7 +6826,34 @@
                 </a:highlight>
                 <a:latin typeface="Consolas" panose="020B0609020204030204" pitchFamily="49" charset="0"/>
               </a:rPr>
-              <a:t>() </a:t>
+              <a:t> e;</a:t>
+            </a:r>
+            <a:endParaRPr lang="ru-RU" dirty="0" smtClean="0">
+              <a:solidFill>
+                <a:srgbClr val="000000"/>
+              </a:solidFill>
+              <a:highlight>
+                <a:srgbClr val="FFFFFF"/>
+              </a:highlight>
+              <a:latin typeface="Consolas" panose="020B0609020204030204" pitchFamily="49" charset="0"/>
+            </a:endParaRPr>
+          </a:p>
+          <a:p>
+            <a:pPr marL="0" indent="0">
+              <a:buFont typeface="Arial" panose="020B0604020202020204" pitchFamily="34" charset="0"/>
+              <a:buNone/>
+            </a:pPr>
+            <a:r>
+              <a:rPr lang="en-US" dirty="0" smtClean="0">
+                <a:solidFill>
+                  <a:srgbClr val="000000"/>
+                </a:solidFill>
+                <a:highlight>
+                  <a:srgbClr val="FFFFFF"/>
+                </a:highlight>
+                <a:latin typeface="Consolas" panose="020B0609020204030204" pitchFamily="49" charset="0"/>
+              </a:rPr>
+              <a:t>	</a:t>
             </a:r>
             <a:r>
               <a:rPr lang="ru-RU" dirty="0" smtClean="0">
@@ -5971,7 +6865,25 @@
                 </a:highlight>
                 <a:latin typeface="Consolas" panose="020B0609020204030204" pitchFamily="49" charset="0"/>
               </a:rPr>
-              <a:t>{</a:t>
+              <a:t>}</a:t>
+            </a:r>
+          </a:p>
+          <a:p>
+            <a:pPr marL="0" indent="0">
+              <a:buFont typeface="Arial" panose="020B0604020202020204" pitchFamily="34" charset="0"/>
+              <a:buNone/>
+            </a:pPr>
+            <a:r>
+              <a:rPr lang="ru-RU" dirty="0" smtClean="0">
+                <a:solidFill>
+                  <a:srgbClr val="000000"/>
+                </a:solidFill>
+                <a:highlight>
+                  <a:srgbClr val="FFFFFF"/>
+                </a:highlight>
+                <a:latin typeface="Consolas" panose="020B0609020204030204" pitchFamily="49" charset="0"/>
+              </a:rPr>
+              <a:t>}</a:t>
             </a:r>
             <a:endParaRPr lang="ru-RU" dirty="0">
               <a:solidFill>
@@ -5983,349 +6895,12 @@
               <a:latin typeface="Consolas" panose="020B0609020204030204" pitchFamily="49" charset="0"/>
             </a:endParaRPr>
           </a:p>
-          <a:p>
-            <a:pPr marL="0" indent="0">
-              <a:buNone/>
-            </a:pPr>
-            <a:r>
-              <a:rPr lang="en-US" dirty="0">
-                <a:solidFill>
-                  <a:srgbClr val="000000"/>
-                </a:solidFill>
-                <a:highlight>
-                  <a:srgbClr val="FFFFFF"/>
-                </a:highlight>
-                <a:latin typeface="Consolas" panose="020B0609020204030204" pitchFamily="49" charset="0"/>
-              </a:rPr>
-              <a:t>    </a:t>
-            </a:r>
-            <a:r>
-              <a:rPr lang="en-US" dirty="0" smtClean="0">
-                <a:solidFill>
-                  <a:srgbClr val="0000FF"/>
-                </a:solidFill>
-                <a:highlight>
-                  <a:srgbClr val="FFFFFF"/>
-                </a:highlight>
-                <a:latin typeface="Consolas" panose="020B0609020204030204" pitchFamily="49" charset="0"/>
-              </a:rPr>
-              <a:t>try </a:t>
-            </a:r>
-            <a:r>
-              <a:rPr lang="ru-RU" dirty="0" smtClean="0">
-                <a:solidFill>
-                  <a:srgbClr val="000000"/>
-                </a:solidFill>
-                <a:highlight>
-                  <a:srgbClr val="FFFFFF"/>
-                </a:highlight>
-                <a:latin typeface="Consolas" panose="020B0609020204030204" pitchFamily="49" charset="0"/>
-              </a:rPr>
-              <a:t>{</a:t>
-            </a:r>
-            <a:endParaRPr lang="ru-RU" dirty="0">
-              <a:solidFill>
-                <a:srgbClr val="000000"/>
-              </a:solidFill>
-              <a:highlight>
-                <a:srgbClr val="FFFFFF"/>
-              </a:highlight>
-              <a:latin typeface="Consolas" panose="020B0609020204030204" pitchFamily="49" charset="0"/>
-            </a:endParaRPr>
-          </a:p>
-          <a:p>
-            <a:pPr marL="0" indent="0">
-              <a:buNone/>
-            </a:pPr>
-            <a:r>
-              <a:rPr lang="en-US" dirty="0">
-                <a:solidFill>
-                  <a:srgbClr val="000000"/>
-                </a:solidFill>
-                <a:highlight>
-                  <a:srgbClr val="FFFFFF"/>
-                </a:highlight>
-                <a:latin typeface="Consolas" panose="020B0609020204030204" pitchFamily="49" charset="0"/>
-              </a:rPr>
-              <a:t>        </a:t>
-            </a:r>
-            <a:r>
-              <a:rPr lang="en-US" dirty="0" err="1">
-                <a:solidFill>
-                  <a:srgbClr val="000000"/>
-                </a:solidFill>
-                <a:highlight>
-                  <a:srgbClr val="FFFFFF"/>
-                </a:highlight>
-                <a:latin typeface="Consolas" panose="020B0609020204030204" pitchFamily="49" charset="0"/>
-              </a:rPr>
-              <a:t>DoEverything</a:t>
-            </a:r>
-            <a:r>
-              <a:rPr lang="en-US" dirty="0">
-                <a:solidFill>
-                  <a:srgbClr val="000000"/>
-                </a:solidFill>
-                <a:highlight>
-                  <a:srgbClr val="FFFFFF"/>
-                </a:highlight>
-                <a:latin typeface="Consolas" panose="020B0609020204030204" pitchFamily="49" charset="0"/>
-              </a:rPr>
-              <a:t>();</a:t>
-            </a:r>
-          </a:p>
-          <a:p>
-            <a:pPr marL="0" indent="0">
-              <a:buNone/>
-            </a:pPr>
-            <a:r>
-              <a:rPr lang="ru-RU" dirty="0">
-                <a:solidFill>
-                  <a:srgbClr val="000000"/>
-                </a:solidFill>
-                <a:highlight>
-                  <a:srgbClr val="FFFFFF"/>
-                </a:highlight>
-                <a:latin typeface="Consolas" panose="020B0609020204030204" pitchFamily="49" charset="0"/>
-              </a:rPr>
-              <a:t>    }</a:t>
-            </a:r>
-          </a:p>
-          <a:p>
-            <a:pPr marL="0" indent="0">
-              <a:buNone/>
-            </a:pPr>
-            <a:r>
-              <a:rPr lang="en-US" dirty="0">
-                <a:solidFill>
-                  <a:srgbClr val="000000"/>
-                </a:solidFill>
-                <a:highlight>
-                  <a:srgbClr val="FFFFFF"/>
-                </a:highlight>
-                <a:latin typeface="Consolas" panose="020B0609020204030204" pitchFamily="49" charset="0"/>
-              </a:rPr>
-              <a:t>    </a:t>
-            </a:r>
-            <a:r>
-              <a:rPr lang="en-US" dirty="0">
-                <a:solidFill>
-                  <a:srgbClr val="0000FF"/>
-                </a:solidFill>
-                <a:highlight>
-                  <a:srgbClr val="FFFFFF"/>
-                </a:highlight>
-                <a:latin typeface="Consolas" panose="020B0609020204030204" pitchFamily="49" charset="0"/>
-              </a:rPr>
-              <a:t>catch</a:t>
-            </a:r>
-            <a:r>
-              <a:rPr lang="en-US" dirty="0">
-                <a:solidFill>
-                  <a:srgbClr val="000000"/>
-                </a:solidFill>
-                <a:highlight>
-                  <a:srgbClr val="FFFFFF"/>
-                </a:highlight>
-                <a:latin typeface="Consolas" panose="020B0609020204030204" pitchFamily="49" charset="0"/>
-              </a:rPr>
-              <a:t> (</a:t>
-            </a:r>
-            <a:r>
-              <a:rPr lang="en-US" dirty="0">
-                <a:solidFill>
-                  <a:srgbClr val="2B91AF"/>
-                </a:solidFill>
-                <a:highlight>
-                  <a:srgbClr val="FFFFFF"/>
-                </a:highlight>
-                <a:latin typeface="Consolas" panose="020B0609020204030204" pitchFamily="49" charset="0"/>
-              </a:rPr>
-              <a:t>Exception</a:t>
-            </a:r>
-            <a:r>
-              <a:rPr lang="en-US" dirty="0">
-                <a:solidFill>
-                  <a:srgbClr val="000000"/>
-                </a:solidFill>
-                <a:highlight>
-                  <a:srgbClr val="FFFFFF"/>
-                </a:highlight>
-                <a:latin typeface="Consolas" panose="020B0609020204030204" pitchFamily="49" charset="0"/>
-              </a:rPr>
-              <a:t> e</a:t>
-            </a:r>
-            <a:r>
-              <a:rPr lang="en-US" dirty="0" smtClean="0">
-                <a:solidFill>
-                  <a:srgbClr val="000000"/>
-                </a:solidFill>
-                <a:highlight>
-                  <a:srgbClr val="FFFFFF"/>
-                </a:highlight>
-                <a:latin typeface="Consolas" panose="020B0609020204030204" pitchFamily="49" charset="0"/>
-              </a:rPr>
-              <a:t>)</a:t>
-            </a:r>
-            <a:r>
-              <a:rPr lang="ru-RU" dirty="0" smtClean="0">
-                <a:solidFill>
-                  <a:srgbClr val="000000"/>
-                </a:solidFill>
-                <a:highlight>
-                  <a:srgbClr val="FFFFFF"/>
-                </a:highlight>
-                <a:latin typeface="Consolas" panose="020B0609020204030204" pitchFamily="49" charset="0"/>
-              </a:rPr>
-              <a:t>{</a:t>
-            </a:r>
-            <a:endParaRPr lang="ru-RU" dirty="0">
-              <a:solidFill>
-                <a:srgbClr val="000000"/>
-              </a:solidFill>
-              <a:highlight>
-                <a:srgbClr val="FFFFFF"/>
-              </a:highlight>
-              <a:latin typeface="Consolas" panose="020B0609020204030204" pitchFamily="49" charset="0"/>
-            </a:endParaRPr>
-          </a:p>
-          <a:p>
-            <a:pPr marL="0" indent="0">
-              <a:buNone/>
-            </a:pPr>
-            <a:r>
-              <a:rPr lang="ru-RU" dirty="0">
-                <a:solidFill>
-                  <a:srgbClr val="000000"/>
-                </a:solidFill>
-                <a:highlight>
-                  <a:srgbClr val="FFFFFF"/>
-                </a:highlight>
-                <a:latin typeface="Consolas" panose="020B0609020204030204" pitchFamily="49" charset="0"/>
-              </a:rPr>
-              <a:t>        </a:t>
-            </a:r>
-            <a:r>
-              <a:rPr lang="ru-RU" dirty="0">
-                <a:solidFill>
-                  <a:srgbClr val="008000"/>
-                </a:solidFill>
-                <a:highlight>
-                  <a:srgbClr val="FFFFFF"/>
-                </a:highlight>
-                <a:latin typeface="Consolas" panose="020B0609020204030204" pitchFamily="49" charset="0"/>
-              </a:rPr>
-              <a:t>// залогировать e для отладки и расследований</a:t>
-            </a:r>
-            <a:endParaRPr lang="ru-RU" dirty="0">
-              <a:solidFill>
-                <a:srgbClr val="000000"/>
-              </a:solidFill>
-              <a:highlight>
-                <a:srgbClr val="FFFFFF"/>
-              </a:highlight>
-              <a:latin typeface="Consolas" panose="020B0609020204030204" pitchFamily="49" charset="0"/>
-            </a:endParaRPr>
-          </a:p>
-          <a:p>
-            <a:pPr marL="0" indent="0">
-              <a:buNone/>
-            </a:pPr>
-            <a:r>
-              <a:rPr lang="ru-RU" dirty="0">
-                <a:solidFill>
-                  <a:srgbClr val="000000"/>
-                </a:solidFill>
-                <a:highlight>
-                  <a:srgbClr val="FFFFFF"/>
-                </a:highlight>
-                <a:latin typeface="Consolas" panose="020B0609020204030204" pitchFamily="49" charset="0"/>
-              </a:rPr>
-              <a:t>        </a:t>
-            </a:r>
-            <a:r>
-              <a:rPr lang="ru-RU" dirty="0">
-                <a:solidFill>
-                  <a:srgbClr val="008000"/>
-                </a:solidFill>
-                <a:highlight>
-                  <a:srgbClr val="FFFFFF"/>
-                </a:highlight>
-                <a:latin typeface="Consolas" panose="020B0609020204030204" pitchFamily="49" charset="0"/>
-              </a:rPr>
-              <a:t>// показать грустного котёнка пользователю</a:t>
-            </a:r>
-            <a:endParaRPr lang="ru-RU" dirty="0">
-              <a:solidFill>
-                <a:srgbClr val="000000"/>
-              </a:solidFill>
-              <a:highlight>
-                <a:srgbClr val="FFFFFF"/>
-              </a:highlight>
-              <a:latin typeface="Consolas" panose="020B0609020204030204" pitchFamily="49" charset="0"/>
-            </a:endParaRPr>
-          </a:p>
-          <a:p>
-            <a:pPr marL="0" indent="0">
-              <a:buNone/>
-            </a:pPr>
-            <a:r>
-              <a:rPr lang="en-US" dirty="0" smtClean="0">
-                <a:solidFill>
-                  <a:srgbClr val="000000"/>
-                </a:solidFill>
-                <a:highlight>
-                  <a:srgbClr val="FFFFFF"/>
-                </a:highlight>
-                <a:latin typeface="Consolas" panose="020B0609020204030204" pitchFamily="49" charset="0"/>
-              </a:rPr>
-              <a:t>    </a:t>
-            </a:r>
-            <a:r>
-              <a:rPr lang="ru-RU" dirty="0" smtClean="0">
-                <a:solidFill>
-                  <a:srgbClr val="000000"/>
-                </a:solidFill>
-                <a:highlight>
-                  <a:srgbClr val="FFFFFF"/>
-                </a:highlight>
-                <a:latin typeface="Consolas" panose="020B0609020204030204" pitchFamily="49" charset="0"/>
-              </a:rPr>
-              <a:t>}</a:t>
-            </a:r>
-            <a:endParaRPr lang="ru-RU" dirty="0">
-              <a:solidFill>
-                <a:srgbClr val="000000"/>
-              </a:solidFill>
-              <a:highlight>
-                <a:srgbClr val="FFFFFF"/>
-              </a:highlight>
-              <a:latin typeface="Consolas" panose="020B0609020204030204" pitchFamily="49" charset="0"/>
-            </a:endParaRPr>
-          </a:p>
-          <a:p>
-            <a:pPr marL="0" indent="0">
-              <a:buNone/>
-            </a:pPr>
-            <a:r>
-              <a:rPr lang="ru-RU" dirty="0">
-                <a:solidFill>
-                  <a:srgbClr val="000000"/>
-                </a:solidFill>
-                <a:highlight>
-                  <a:srgbClr val="FFFFFF"/>
-                </a:highlight>
-                <a:latin typeface="Consolas" panose="020B0609020204030204" pitchFamily="49" charset="0"/>
-              </a:rPr>
-              <a:t>}</a:t>
-            </a:r>
-          </a:p>
         </p:txBody>
       </p:sp>
     </p:spTree>
     <p:extLst>
       <p:ext uri="{BB962C8B-B14F-4D97-AF65-F5344CB8AC3E}">
-        <p14:creationId xmlns:p14="http://schemas.microsoft.com/office/powerpoint/2010/main" val="1447770033"/>
+        <p14:creationId xmlns:p14="http://schemas.microsoft.com/office/powerpoint/2010/main" val="271700807"/>
       </p:ext>
     </p:extLst>
   </p:cSld>
@@ -6385,7 +6960,7 @@
             </a:br>
             <a:r>
               <a:rPr lang="ru-RU" dirty="0" smtClean="0"/>
-              <a:t>Обработай ожидаемые проблемы</a:t>
+              <a:t>Ожидаемые проблемы — обработай!</a:t>
             </a:r>
             <a:endParaRPr lang="ru-RU" dirty="0"/>
           </a:p>
@@ -6434,12 +7009,6 @@
           </a:p>
           <a:p>
             <a:r>
-              <a:rPr lang="ru-RU" dirty="0"/>
-              <a:t>Недоступность базы данных</a:t>
-            </a:r>
-          </a:p>
-          <a:p>
-            <a:r>
               <a:rPr lang="ru-RU" dirty="0" smtClean="0"/>
               <a:t>Нарушение </a:t>
             </a:r>
@@ -6501,90 +7070,13 @@
           </a:p>
           <a:p>
             <a:r>
-              <a:rPr lang="ru-RU" dirty="0"/>
-              <a:t>Залогировать</a:t>
-            </a:r>
+              <a:rPr lang="ru-RU" dirty="0" smtClean="0"/>
+              <a:t>Уточни сообщение об ошибке</a:t>
+            </a:r>
+            <a:endParaRPr lang="ru-RU" dirty="0"/>
           </a:p>
         </p:txBody>
       </p:sp>
-      <mc:AlternateContent xmlns:mc="http://schemas.openxmlformats.org/markup-compatibility/2006" xmlns:p14="http://schemas.microsoft.com/office/powerpoint/2010/main">
-        <mc:Choice Requires="p14">
-          <p:contentPart p14:bwMode="auto" r:id="rId2">
-            <p14:nvContentPartPr>
-              <p14:cNvPr id="8" name="Рукописный ввод 7"/>
-              <p14:cNvContentPartPr/>
-              <p14:nvPr/>
-            </p14:nvContentPartPr>
-            <p14:xfrm>
-              <a:off x="6122614" y="3885073"/>
-              <a:ext cx="2504880" cy="231480"/>
-            </p14:xfrm>
-          </p:contentPart>
-        </mc:Choice>
-        <mc:Fallback xmlns="">
-          <p:pic>
-            <p:nvPicPr>
-              <p:cNvPr id="8" name="Рукописный ввод 7"/>
-              <p:cNvPicPr/>
-              <p:nvPr/>
-            </p:nvPicPr>
-            <p:blipFill>
-              <a:blip r:embed="rId3"/>
-              <a:stretch>
-                <a:fillRect/>
-              </a:stretch>
-            </p:blipFill>
-            <p:spPr>
-              <a:xfrm>
-                <a:off x="6110734" y="3873193"/>
-                <a:ext cx="2528640" cy="255240"/>
-              </a:xfrm>
-              <a:prstGeom prst="rect">
-                <a:avLst/>
-              </a:prstGeom>
-            </p:spPr>
-          </p:pic>
-        </mc:Fallback>
-      </mc:AlternateContent>
-      <mc:AlternateContent xmlns:mc="http://schemas.openxmlformats.org/markup-compatibility/2006" xmlns:p14="http://schemas.microsoft.com/office/powerpoint/2010/main">
-        <mc:Choice Requires="p14">
-          <p:contentPart p14:bwMode="auto" r:id="rId4">
-            <p14:nvContentPartPr>
-              <p14:cNvPr id="10" name="Рукописный ввод 9"/>
-              <p14:cNvContentPartPr/>
-              <p14:nvPr/>
-            </p14:nvContentPartPr>
-            <p14:xfrm>
-              <a:off x="6430774" y="3756913"/>
-              <a:ext cx="2127240" cy="487440"/>
-            </p14:xfrm>
-          </p:contentPart>
-        </mc:Choice>
-        <mc:Fallback xmlns="">
-          <p:pic>
-            <p:nvPicPr>
-              <p:cNvPr id="10" name="Рукописный ввод 9"/>
-              <p:cNvPicPr/>
-              <p:nvPr/>
-            </p:nvPicPr>
-            <p:blipFill>
-              <a:blip r:embed="rId5"/>
-              <a:stretch>
-                <a:fillRect/>
-              </a:stretch>
-            </p:blipFill>
-            <p:spPr>
-              <a:xfrm>
-                <a:off x="6418894" y="3745033"/>
-                <a:ext cx="2151000" cy="511200"/>
-              </a:xfrm>
-              <a:prstGeom prst="rect">
-                <a:avLst/>
-              </a:prstGeom>
-            </p:spPr>
-          </p:pic>
-        </mc:Fallback>
-      </mc:AlternateContent>
     </p:spTree>
     <p:extLst>
       <p:ext uri="{BB962C8B-B14F-4D97-AF65-F5344CB8AC3E}">
@@ -6825,9 +7317,9 @@
                                           </p:stCondLst>
                                         </p:cTn>
                                         <p:tgtEl>
-                                          <p:spTgt spid="3">
+                                          <p:spTgt spid="4">
                                             <p:txEl>
-                                              <p:pRg st="4" end="4"/>
+                                              <p:pRg st="0" end="0"/>
                                             </p:txEl>
                                           </p:spTgt>
                                         </p:tgtEl>
@@ -6876,7 +7368,7 @@
                                         <p:tgtEl>
                                           <p:spTgt spid="4">
                                             <p:txEl>
-                                              <p:pRg st="0" end="0"/>
+                                              <p:pRg st="1" end="1"/>
                                             </p:txEl>
                                           </p:spTgt>
                                         </p:tgtEl>
@@ -6925,7 +7417,7 @@
                                         <p:tgtEl>
                                           <p:spTgt spid="4">
                                             <p:txEl>
-                                              <p:pRg st="1" end="1"/>
+                                              <p:pRg st="2" end="2"/>
                                             </p:txEl>
                                           </p:spTgt>
                                         </p:tgtEl>
@@ -6974,130 +7466,9 @@
                                         <p:tgtEl>
                                           <p:spTgt spid="4">
                                             <p:txEl>
-                                              <p:pRg st="2" end="2"/>
-                                            </p:txEl>
-                                          </p:spTgt>
-                                        </p:tgtEl>
-                                        <p:attrNameLst>
-                                          <p:attrName>style.visibility</p:attrName>
-                                        </p:attrNameLst>
-                                      </p:cBhvr>
-                                      <p:to>
-                                        <p:strVal val="visible"/>
-                                      </p:to>
-                                    </p:set>
-                                  </p:childTnLst>
-                                </p:cTn>
-                              </p:par>
-                            </p:childTnLst>
-                          </p:cTn>
-                        </p:par>
-                      </p:childTnLst>
-                    </p:cTn>
-                  </p:par>
-                  <p:par>
-                    <p:cTn id="35" fill="hold">
-                      <p:stCondLst>
-                        <p:cond delay="indefinite"/>
-                      </p:stCondLst>
-                      <p:childTnLst>
-                        <p:par>
-                          <p:cTn id="36" fill="hold">
-                            <p:stCondLst>
-                              <p:cond delay="0"/>
-                            </p:stCondLst>
-                            <p:childTnLst>
-                              <p:par>
-                                <p:cTn id="37" presetID="1" presetClass="entr" presetSubtype="0" fill="hold" grpId="0" nodeType="clickEffect">
-                                  <p:stCondLst>
-                                    <p:cond delay="0"/>
-                                  </p:stCondLst>
-                                  <p:childTnLst>
-                                    <p:set>
-                                      <p:cBhvr>
-                                        <p:cTn id="38" dur="1" fill="hold">
-                                          <p:stCondLst>
-                                            <p:cond delay="0"/>
-                                          </p:stCondLst>
-                                        </p:cTn>
-                                        <p:tgtEl>
-                                          <p:spTgt spid="4">
-                                            <p:txEl>
                                               <p:pRg st="3" end="3"/>
                                             </p:txEl>
                                           </p:spTgt>
-                                        </p:tgtEl>
-                                        <p:attrNameLst>
-                                          <p:attrName>style.visibility</p:attrName>
-                                        </p:attrNameLst>
-                                      </p:cBhvr>
-                                      <p:to>
-                                        <p:strVal val="visible"/>
-                                      </p:to>
-                                    </p:set>
-                                  </p:childTnLst>
-                                </p:cTn>
-                              </p:par>
-                            </p:childTnLst>
-                          </p:cTn>
-                        </p:par>
-                      </p:childTnLst>
-                    </p:cTn>
-                  </p:par>
-                  <p:par>
-                    <p:cTn id="39" fill="hold">
-                      <p:stCondLst>
-                        <p:cond delay="indefinite"/>
-                      </p:stCondLst>
-                      <p:childTnLst>
-                        <p:par>
-                          <p:cTn id="40" fill="hold">
-                            <p:stCondLst>
-                              <p:cond delay="0"/>
-                            </p:stCondLst>
-                            <p:childTnLst>
-                              <p:par>
-                                <p:cTn id="41" presetID="1" presetClass="entr" presetSubtype="0" fill="hold" nodeType="clickEffect">
-                                  <p:stCondLst>
-                                    <p:cond delay="0"/>
-                                  </p:stCondLst>
-                                  <p:childTnLst>
-                                    <p:set>
-                                      <p:cBhvr>
-                                        <p:cTn id="42" dur="1" fill="hold">
-                                          <p:stCondLst>
-                                            <p:cond delay="0"/>
-                                          </p:stCondLst>
-                                        </p:cTn>
-                                        <p:tgtEl>
-                                          <p:spTgt spid="10"/>
-                                        </p:tgtEl>
-                                        <p:attrNameLst>
-                                          <p:attrName>style.visibility</p:attrName>
-                                        </p:attrNameLst>
-                                      </p:cBhvr>
-                                      <p:to>
-                                        <p:strVal val="visible"/>
-                                      </p:to>
-                                    </p:set>
-                                  </p:childTnLst>
-                                </p:cTn>
-                              </p:par>
-                              <p:par>
-                                <p:cTn id="43" presetID="1" presetClass="entr" presetSubtype="0" fill="hold" nodeType="withEffect">
-                                  <p:stCondLst>
-                                    <p:cond delay="0"/>
-                                  </p:stCondLst>
-                                  <p:childTnLst>
-                                    <p:set>
-                                      <p:cBhvr>
-                                        <p:cTn id="44" dur="1" fill="hold">
-                                          <p:stCondLst>
-                                            <p:cond delay="0"/>
-                                          </p:stCondLst>
-                                        </p:cTn>
-                                        <p:tgtEl>
-                                          <p:spTgt spid="8"/>
                                         </p:tgtEl>
                                         <p:attrNameLst>
                                           <p:attrName>style.visibility</p:attrName>
@@ -8497,12 +8868,12 @@
           <a:lstStyle/>
           <a:p>
             <a:r>
-              <a:rPr lang="ru-RU" dirty="0"/>
-              <a:t>П</a:t>
-            </a:r>
-            <a:r>
               <a:rPr lang="ru-RU" dirty="0" smtClean="0"/>
-              <a:t>родублируйте текст </a:t>
+              <a:t>Продублируй </a:t>
+            </a:r>
+            <a:r>
+              <a:rPr lang="ru-RU" dirty="0" smtClean="0"/>
+              <a:t>текст </a:t>
             </a:r>
             <a:r>
               <a:rPr lang="en-US" dirty="0" err="1" smtClean="0"/>

</xml_diff>

<commit_message>
presentation updated (AccessViolationException and slide order)
</commit_message>
<xml_diff>
--- a/exceptions.pptx
+++ b/exceptions.pptx
@@ -6,7 +6,7 @@
     <p:sldMasterId id="2147483812" r:id="rId2"/>
   </p:sldMasterIdLst>
   <p:notesMasterIdLst>
-    <p:notesMasterId r:id="rId45"/>
+    <p:notesMasterId r:id="rId46"/>
   </p:notesMasterIdLst>
   <p:sldIdLst>
     <p:sldId id="362" r:id="rId3"/>
@@ -49,8 +49,9 @@
     <p:sldId id="404" r:id="rId40"/>
     <p:sldId id="405" r:id="rId41"/>
     <p:sldId id="406" r:id="rId42"/>
-    <p:sldId id="407" r:id="rId43"/>
-    <p:sldId id="408" r:id="rId44"/>
+    <p:sldId id="410" r:id="rId43"/>
+    <p:sldId id="407" r:id="rId44"/>
+    <p:sldId id="408" r:id="rId45"/>
   </p:sldIdLst>
   <p:sldSz cx="12192000" cy="6858000"/>
   <p:notesSz cx="6858000" cy="9144000"/>
@@ -213,6 +214,7 @@
             <p14:sldId id="404"/>
             <p14:sldId id="405"/>
             <p14:sldId id="406"/>
+            <p14:sldId id="410"/>
             <p14:sldId id="407"/>
             <p14:sldId id="408"/>
           </p14:sldIdLst>
@@ -7066,7 +7068,7 @@
           <a:p>
             <a:fld id="{16E5F246-0B7D-44DF-8C1B-EDFCA5DA626A}" type="datetimeFigureOut">
               <a:rPr lang="ru-RU" smtClean="0"/>
-              <a:t>04.12.2017</a:t>
+              <a:t>06.12.2017</a:t>
             </a:fld>
             <a:endParaRPr lang="ru-RU"/>
           </a:p>
@@ -8688,15 +8690,73 @@
               <a:rPr lang="ru-RU" altLang="ru-RU" baseline="0" dirty="0" smtClean="0">
                 <a:latin typeface="Arial" panose="020B0604020202020204" pitchFamily="34" charset="0"/>
               </a:rPr>
-              <a:t> как можно больше ошибок</a:t>
-            </a:r>
-          </a:p>
-          <a:p>
-            <a:pPr eaLnBrk="1" hangingPunct="1"/>
+              <a:t> как можно больше </a:t>
+            </a:r>
+            <a:r>
+              <a:rPr lang="ru-RU" altLang="ru-RU" baseline="0" dirty="0" smtClean="0">
+                <a:latin typeface="Arial" panose="020B0604020202020204" pitchFamily="34" charset="0"/>
+              </a:rPr>
+              <a:t>ошибок</a:t>
+            </a:r>
+          </a:p>
+          <a:p>
+            <a:pPr marL="0" marR="0" lvl="0" indent="0" algn="l" defTabSz="914400" rtl="0" eaLnBrk="1" fontAlgn="auto" latinLnBrk="0" hangingPunct="1">
+              <a:lnSpc>
+                <a:spcPct val="100000"/>
+              </a:lnSpc>
+              <a:spcBef>
+                <a:spcPts val="0"/>
+              </a:spcBef>
+              <a:spcAft>
+                <a:spcPts val="0"/>
+              </a:spcAft>
+              <a:buClrTx/>
+              <a:buSzTx/>
+              <a:buFontTx/>
+              <a:buNone/>
+              <a:tabLst/>
+              <a:defRPr/>
+            </a:pPr>
+            <a:r>
+              <a:rPr lang="ru-RU" altLang="ru-RU" baseline="0" dirty="0" smtClean="0">
+                <a:latin typeface="Arial" panose="020B0604020202020204" pitchFamily="34" charset="0"/>
+              </a:rPr>
+              <a:t>Вместе с фамилиями указать стол – в </a:t>
+            </a:r>
+            <a:r>
+              <a:rPr lang="en-US" altLang="ru-RU" baseline="0" dirty="0" smtClean="0">
+                <a:latin typeface="Arial" panose="020B0604020202020204" pitchFamily="34" charset="0"/>
+              </a:rPr>
+              <a:t>Names </a:t>
+            </a:r>
+            <a:r>
+              <a:rPr lang="ru-RU" altLang="ru-RU" baseline="0" dirty="0" smtClean="0">
+                <a:latin typeface="Arial" panose="020B0604020202020204" pitchFamily="34" charset="0"/>
+              </a:rPr>
+              <a:t>в </a:t>
+            </a:r>
             <a:r>
               <a:rPr lang="en-US" altLang="ru-RU" baseline="0" dirty="0" err="1" smtClean="0">
                 <a:latin typeface="Arial" panose="020B0604020202020204" pitchFamily="34" charset="0"/>
               </a:rPr>
+              <a:t>ConvertersProgram_should</a:t>
+            </a:r>
+            <a:endParaRPr lang="ru-RU" altLang="ru-RU" baseline="0" dirty="0" smtClean="0">
+              <a:latin typeface="Arial" panose="020B0604020202020204" pitchFamily="34" charset="0"/>
+            </a:endParaRPr>
+          </a:p>
+          <a:p>
+            <a:pPr eaLnBrk="1" hangingPunct="1"/>
+            <a:endParaRPr lang="ru-RU" altLang="ru-RU" baseline="0" dirty="0" smtClean="0">
+              <a:latin typeface="Arial" panose="020B0604020202020204" pitchFamily="34" charset="0"/>
+            </a:endParaRPr>
+          </a:p>
+          <a:p>
+            <a:pPr eaLnBrk="1" hangingPunct="1"/>
+            <a:r>
+              <a:rPr lang="en-US" altLang="ru-RU" baseline="0" dirty="0" err="1" smtClean="0">
+                <a:latin typeface="Arial" panose="020B0604020202020204" pitchFamily="34" charset="0"/>
+              </a:rPr>
               <a:t>progressBoard</a:t>
             </a:r>
             <a:r>
@@ -8715,46 +8775,13 @@
               <a:rPr lang="ru-RU" altLang="ru-RU" baseline="0" dirty="0" smtClean="0">
                 <a:latin typeface="Arial" panose="020B0604020202020204" pitchFamily="34" charset="0"/>
               </a:rPr>
-              <a:t> и подсказывать по нему</a:t>
-            </a:r>
-          </a:p>
-          <a:p>
-            <a:pPr eaLnBrk="1" hangingPunct="1"/>
+              <a:t> и подсказывать по </a:t>
+            </a:r>
             <a:r>
               <a:rPr lang="ru-RU" altLang="ru-RU" baseline="0" dirty="0" smtClean="0">
                 <a:latin typeface="Arial" panose="020B0604020202020204" pitchFamily="34" charset="0"/>
               </a:rPr>
-              <a:t>Вместе с фамилиями указать стол</a:t>
-            </a:r>
-            <a:r>
-              <a:rPr lang="ru-RU" altLang="ru-RU" baseline="0" dirty="0">
-                <a:latin typeface="Arial" panose="020B0604020202020204" pitchFamily="34" charset="0"/>
-              </a:rPr>
-              <a:t> </a:t>
-            </a:r>
-            <a:r>
-              <a:rPr lang="ru-RU" altLang="ru-RU" baseline="0" dirty="0" smtClean="0">
-                <a:latin typeface="Arial" panose="020B0604020202020204" pitchFamily="34" charset="0"/>
-              </a:rPr>
-              <a:t>– в </a:t>
-            </a:r>
-            <a:r>
-              <a:rPr lang="en-US" altLang="ru-RU" baseline="0" dirty="0" smtClean="0">
-                <a:latin typeface="Arial" panose="020B0604020202020204" pitchFamily="34" charset="0"/>
-              </a:rPr>
-              <a:t>Names </a:t>
-            </a:r>
-            <a:r>
-              <a:rPr lang="ru-RU" altLang="ru-RU" baseline="0" dirty="0" smtClean="0">
-                <a:latin typeface="Arial" panose="020B0604020202020204" pitchFamily="34" charset="0"/>
-              </a:rPr>
-              <a:t>в </a:t>
-            </a:r>
-            <a:r>
-              <a:rPr lang="en-US" altLang="ru-RU" baseline="0" dirty="0" err="1" smtClean="0">
-                <a:latin typeface="Arial" panose="020B0604020202020204" pitchFamily="34" charset="0"/>
-              </a:rPr>
-              <a:t>ConvertersProgram_should</a:t>
+              <a:t>нему</a:t>
             </a:r>
             <a:endParaRPr lang="ru-RU" altLang="ru-RU" baseline="0" dirty="0" smtClean="0">
               <a:latin typeface="Arial" panose="020B0604020202020204" pitchFamily="34" charset="0"/>
@@ -10583,8 +10610,50 @@
           <a:lstStyle/>
           <a:p>
             <a:r>
+              <a:rPr lang="ru-RU" dirty="0" err="1" smtClean="0"/>
+              <a:t>Стековерфлоу</a:t>
+            </a:r>
+            <a:r>
               <a:rPr lang="ru-RU" dirty="0" smtClean="0"/>
-              <a:t>Чем плох код?</a:t>
+              <a:t> возникает из-за того, что память под стек</a:t>
+            </a:r>
+            <a:r>
+              <a:rPr lang="ru-RU" baseline="0" dirty="0" smtClean="0"/>
+              <a:t> выделяется не при запуске потока, а по необходимости. Можно либо сразу создать поток с нужным размером стека или настроить в </a:t>
+            </a:r>
+            <a:r>
+              <a:rPr lang="ru-RU" baseline="0" dirty="0" err="1" smtClean="0"/>
+              <a:t>апп</a:t>
+            </a:r>
+            <a:r>
+              <a:rPr lang="ru-RU" baseline="0" dirty="0" smtClean="0"/>
+              <a:t> </a:t>
+            </a:r>
+            <a:r>
+              <a:rPr lang="ru-RU" baseline="0" dirty="0" err="1" smtClean="0"/>
+              <a:t>конфиге</a:t>
+            </a:r>
+            <a:endParaRPr lang="ru-RU" baseline="0" dirty="0" smtClean="0"/>
+          </a:p>
+          <a:p>
+            <a:endParaRPr lang="ru-RU" baseline="0" dirty="0" smtClean="0"/>
+          </a:p>
+          <a:p>
+            <a:r>
+              <a:rPr lang="ru-RU" baseline="0" dirty="0" smtClean="0"/>
+              <a:t>Интересно, что в документации описано противоположное поведение</a:t>
+            </a:r>
+            <a:r>
+              <a:rPr lang="en-US" baseline="0" dirty="0" smtClean="0"/>
+              <a:t>. </a:t>
+            </a:r>
+            <a:r>
+              <a:rPr lang="ru-RU" baseline="0" dirty="0" smtClean="0"/>
+              <a:t>Документации можно верить не всегда, </a:t>
+            </a:r>
+            <a:r>
+              <a:rPr lang="ru-RU" baseline="0" smtClean="0"/>
+              <a:t>нужно проверять</a:t>
             </a:r>
             <a:endParaRPr lang="ru-RU" dirty="0"/>
           </a:p>
@@ -10616,7 +10685,7 @@
     </p:spTree>
     <p:extLst>
       <p:ext uri="{BB962C8B-B14F-4D97-AF65-F5344CB8AC3E}">
-        <p14:creationId xmlns:p14="http://schemas.microsoft.com/office/powerpoint/2010/main" val="1610563261"/>
+        <p14:creationId xmlns:p14="http://schemas.microsoft.com/office/powerpoint/2010/main" val="757342560"/>
       </p:ext>
     </p:extLst>
   </p:cSld>
@@ -10671,114 +10740,8 @@
           <a:lstStyle/>
           <a:p>
             <a:r>
-              <a:rPr lang="en-US" dirty="0" smtClean="0"/>
-              <a:t>Finally – </a:t>
-            </a:r>
-            <a:r>
-              <a:rPr lang="ru-RU" dirty="0" err="1" smtClean="0"/>
-              <a:t>фича</a:t>
-            </a:r>
-            <a:r>
               <a:rPr lang="ru-RU" dirty="0" smtClean="0"/>
-              <a:t> </a:t>
-            </a:r>
-            <a:r>
-              <a:rPr lang="ru-RU" dirty="0" err="1" smtClean="0"/>
-              <a:t>дотнета</a:t>
-            </a:r>
-            <a:r>
-              <a:rPr lang="ru-RU" dirty="0" smtClean="0"/>
-              <a:t>,</a:t>
-            </a:r>
-            <a:r>
-              <a:rPr lang="ru-RU" baseline="0" dirty="0" smtClean="0"/>
-              <a:t> ОС она безразлична</a:t>
-            </a:r>
-          </a:p>
-          <a:p>
-            <a:r>
-              <a:rPr lang="en-US" baseline="0" dirty="0" smtClean="0"/>
-              <a:t>finally </a:t>
-            </a:r>
-            <a:r>
-              <a:rPr lang="ru-RU" baseline="0" dirty="0" smtClean="0"/>
-              <a:t>работает, пока процесс и </a:t>
-            </a:r>
-            <a:r>
-              <a:rPr lang="ru-RU" baseline="0" dirty="0" err="1" smtClean="0"/>
-              <a:t>рантайм</a:t>
-            </a:r>
-            <a:r>
-              <a:rPr lang="en-US" baseline="0" dirty="0" smtClean="0"/>
-              <a:t> </a:t>
-            </a:r>
-            <a:r>
-              <a:rPr lang="ru-RU" baseline="0" dirty="0" smtClean="0"/>
-              <a:t>работают нормально</a:t>
-            </a:r>
-          </a:p>
-          <a:p>
-            <a:r>
-              <a:rPr lang="ru-RU" baseline="0" dirty="0" smtClean="0"/>
-              <a:t>Но </a:t>
-            </a:r>
-            <a:r>
-              <a:rPr lang="en-US" baseline="0" dirty="0" smtClean="0"/>
-              <a:t>finally </a:t>
-            </a:r>
-            <a:r>
-              <a:rPr lang="ru-RU" baseline="0" dirty="0" smtClean="0"/>
-              <a:t>имеет смысл использовать лишь для выполнения кода в независимости от наличия исключения</a:t>
-            </a:r>
-          </a:p>
-          <a:p>
-            <a:r>
-              <a:rPr lang="ru-RU" baseline="0" dirty="0" smtClean="0"/>
-              <a:t>Нестандартное применение – код</a:t>
-            </a:r>
-            <a:r>
-              <a:rPr lang="en-US" baseline="0" dirty="0" smtClean="0"/>
-              <a:t> </a:t>
-            </a:r>
-            <a:r>
-              <a:rPr lang="ru-RU" baseline="0" dirty="0" smtClean="0"/>
-              <a:t>в </a:t>
-            </a:r>
-            <a:r>
-              <a:rPr lang="en-US" baseline="0" dirty="0" smtClean="0"/>
-              <a:t>finally </a:t>
-            </a:r>
-            <a:r>
-              <a:rPr lang="ru-RU" baseline="0" dirty="0" smtClean="0"/>
-              <a:t>не прерывается </a:t>
-            </a:r>
-            <a:r>
-              <a:rPr lang="en-US" baseline="0" dirty="0" err="1" smtClean="0"/>
-              <a:t>ThreadAbortException</a:t>
-            </a:r>
-            <a:r>
-              <a:rPr lang="en-US" baseline="0" dirty="0" smtClean="0"/>
-              <a:t>’</a:t>
-            </a:r>
-            <a:r>
-              <a:rPr lang="ru-RU" baseline="0" dirty="0" smtClean="0"/>
-              <a:t>ом. Это иногда используется в самом </a:t>
-            </a:r>
-            <a:r>
-              <a:rPr lang="ru-RU" baseline="0" dirty="0" err="1" smtClean="0"/>
-              <a:t>дотнете</a:t>
-            </a:r>
-            <a:r>
-              <a:rPr lang="ru-RU" baseline="0" dirty="0" smtClean="0"/>
-              <a:t>. Не используйте это, пока не найдёте, где это написано в </a:t>
-            </a:r>
-            <a:r>
-              <a:rPr lang="ru-RU" baseline="0" dirty="0" err="1" smtClean="0"/>
-              <a:t>документаци</a:t>
-            </a:r>
-            <a:r>
-              <a:rPr lang="ru-RU" baseline="0" dirty="0" smtClean="0"/>
-              <a:t>!</a:t>
+              <a:t>Чем плох код?</a:t>
             </a:r>
             <a:endParaRPr lang="ru-RU" dirty="0"/>
           </a:p>
@@ -10802,6 +10765,200 @@
             <a:fld id="{3BAECB10-9972-4830-A584-02C41DAFD45B}" type="slidenum">
               <a:rPr lang="ru-RU" smtClean="0"/>
               <a:t>42</a:t>
+            </a:fld>
+            <a:endParaRPr lang="ru-RU"/>
+          </a:p>
+        </p:txBody>
+      </p:sp>
+    </p:spTree>
+    <p:extLst>
+      <p:ext uri="{BB962C8B-B14F-4D97-AF65-F5344CB8AC3E}">
+        <p14:creationId xmlns:p14="http://schemas.microsoft.com/office/powerpoint/2010/main" val="1610563261"/>
+      </p:ext>
+    </p:extLst>
+  </p:cSld>
+  <p:clrMapOvr>
+    <a:masterClrMapping/>
+  </p:clrMapOvr>
+</p:notes>
+</file>
+
+<file path=ppt/notesSlides/notesSlide34.xml><?xml version="1.0" encoding="utf-8"?>
+<p:notes xmlns:a="http://schemas.openxmlformats.org/drawingml/2006/main" xmlns:r="http://schemas.openxmlformats.org/officeDocument/2006/relationships" xmlns:p="http://schemas.openxmlformats.org/presentationml/2006/main">
+  <p:cSld>
+    <p:spTree>
+      <p:nvGrpSpPr>
+        <p:cNvPr id="1" name=""/>
+        <p:cNvGrpSpPr/>
+        <p:nvPr/>
+      </p:nvGrpSpPr>
+      <p:grpSpPr>
+        <a:xfrm>
+          <a:off x="0" y="0"/>
+          <a:ext cx="0" cy="0"/>
+          <a:chOff x="0" y="0"/>
+          <a:chExt cx="0" cy="0"/>
+        </a:xfrm>
+      </p:grpSpPr>
+      <p:sp>
+        <p:nvSpPr>
+          <p:cNvPr id="2" name="Образ слайда 1"/>
+          <p:cNvSpPr>
+            <a:spLocks noGrp="1" noRot="1" noChangeAspect="1"/>
+          </p:cNvSpPr>
+          <p:nvPr>
+            <p:ph type="sldImg"/>
+          </p:nvPr>
+        </p:nvSpPr>
+        <p:spPr/>
+      </p:sp>
+      <p:sp>
+        <p:nvSpPr>
+          <p:cNvPr id="3" name="Заметки 2"/>
+          <p:cNvSpPr>
+            <a:spLocks noGrp="1"/>
+          </p:cNvSpPr>
+          <p:nvPr>
+            <p:ph type="body" idx="1"/>
+          </p:nvPr>
+        </p:nvSpPr>
+        <p:spPr/>
+        <p:txBody>
+          <a:bodyPr/>
+          <a:lstStyle/>
+          <a:p>
+            <a:r>
+              <a:rPr lang="en-US" dirty="0" smtClean="0"/>
+              <a:t>Finally – </a:t>
+            </a:r>
+            <a:r>
+              <a:rPr lang="ru-RU" dirty="0" err="1" smtClean="0"/>
+              <a:t>фича</a:t>
+            </a:r>
+            <a:r>
+              <a:rPr lang="ru-RU" dirty="0" smtClean="0"/>
+              <a:t> </a:t>
+            </a:r>
+            <a:r>
+              <a:rPr lang="ru-RU" dirty="0" err="1" smtClean="0"/>
+              <a:t>дотнета</a:t>
+            </a:r>
+            <a:r>
+              <a:rPr lang="ru-RU" dirty="0" smtClean="0"/>
+              <a:t>,</a:t>
+            </a:r>
+            <a:r>
+              <a:rPr lang="ru-RU" baseline="0" dirty="0" smtClean="0"/>
+              <a:t> ОС она безразлична</a:t>
+            </a:r>
+          </a:p>
+          <a:p>
+            <a:r>
+              <a:rPr lang="en-US" baseline="0" dirty="0" smtClean="0"/>
+              <a:t>finally </a:t>
+            </a:r>
+            <a:r>
+              <a:rPr lang="ru-RU" baseline="0" dirty="0" smtClean="0"/>
+              <a:t>работает, пока процесс и </a:t>
+            </a:r>
+            <a:r>
+              <a:rPr lang="ru-RU" baseline="0" dirty="0" err="1" smtClean="0"/>
+              <a:t>рантайм</a:t>
+            </a:r>
+            <a:r>
+              <a:rPr lang="en-US" baseline="0" dirty="0" smtClean="0"/>
+              <a:t> </a:t>
+            </a:r>
+            <a:r>
+              <a:rPr lang="ru-RU" baseline="0" dirty="0" smtClean="0"/>
+              <a:t>работают нормально</a:t>
+            </a:r>
+          </a:p>
+          <a:p>
+            <a:r>
+              <a:rPr lang="ru-RU" baseline="0" dirty="0" smtClean="0"/>
+              <a:t>Но </a:t>
+            </a:r>
+            <a:r>
+              <a:rPr lang="en-US" baseline="0" dirty="0" smtClean="0"/>
+              <a:t>finally </a:t>
+            </a:r>
+            <a:r>
+              <a:rPr lang="ru-RU" baseline="0" dirty="0" smtClean="0"/>
+              <a:t>имеет смысл использовать лишь для выполнения кода в независимости от наличия исключения</a:t>
+            </a:r>
+          </a:p>
+          <a:p>
+            <a:r>
+              <a:rPr lang="ru-RU" baseline="0" dirty="0" smtClean="0"/>
+              <a:t>Нестандартное применение – код</a:t>
+            </a:r>
+            <a:r>
+              <a:rPr lang="en-US" baseline="0" dirty="0" smtClean="0"/>
+              <a:t> </a:t>
+            </a:r>
+            <a:r>
+              <a:rPr lang="ru-RU" baseline="0" dirty="0" smtClean="0"/>
+              <a:t>в </a:t>
+            </a:r>
+            <a:r>
+              <a:rPr lang="en-US" baseline="0" dirty="0" smtClean="0"/>
+              <a:t>finally </a:t>
+            </a:r>
+            <a:r>
+              <a:rPr lang="ru-RU" baseline="0" dirty="0" smtClean="0"/>
+              <a:t>не прерывается </a:t>
+            </a:r>
+            <a:r>
+              <a:rPr lang="en-US" baseline="0" dirty="0" err="1" smtClean="0"/>
+              <a:t>ThreadAbortException</a:t>
+            </a:r>
+            <a:r>
+              <a:rPr lang="en-US" baseline="0" dirty="0" smtClean="0"/>
+              <a:t>’</a:t>
+            </a:r>
+            <a:r>
+              <a:rPr lang="ru-RU" baseline="0" dirty="0" smtClean="0"/>
+              <a:t>ом. Это иногда используется в самом </a:t>
+            </a:r>
+            <a:r>
+              <a:rPr lang="ru-RU" baseline="0" dirty="0" err="1" smtClean="0"/>
+              <a:t>дотнете</a:t>
+            </a:r>
+            <a:r>
+              <a:rPr lang="ru-RU" baseline="0" dirty="0" smtClean="0"/>
+              <a:t>. Не используйте это, пока не найдёте, где это написано в </a:t>
+            </a:r>
+            <a:r>
+              <a:rPr lang="ru-RU" baseline="0" dirty="0" err="1" smtClean="0"/>
+              <a:t>документаци</a:t>
+            </a:r>
+            <a:r>
+              <a:rPr lang="ru-RU" baseline="0" dirty="0" smtClean="0"/>
+              <a:t>!</a:t>
+            </a:r>
+            <a:endParaRPr lang="ru-RU" dirty="0"/>
+          </a:p>
+        </p:txBody>
+      </p:sp>
+      <p:sp>
+        <p:nvSpPr>
+          <p:cNvPr id="4" name="Номер слайда 3"/>
+          <p:cNvSpPr>
+            <a:spLocks noGrp="1"/>
+          </p:cNvSpPr>
+          <p:nvPr>
+            <p:ph type="sldNum" sz="quarter" idx="10"/>
+          </p:nvPr>
+        </p:nvSpPr>
+        <p:spPr/>
+        <p:txBody>
+          <a:bodyPr/>
+          <a:lstStyle/>
+          <a:p>
+            <a:fld id="{3BAECB10-9972-4830-A584-02C41DAFD45B}" type="slidenum">
+              <a:rPr lang="ru-RU" smtClean="0"/>
+              <a:t>43</a:t>
             </a:fld>
             <a:endParaRPr lang="ru-RU"/>
           </a:p>
@@ -11632,11 +11789,7 @@
             </a:r>
             <a:r>
               <a:rPr lang="ru-RU" baseline="0" dirty="0" smtClean="0"/>
-              <a:t>он не должен вернуть </a:t>
-            </a:r>
-            <a:r>
-              <a:rPr lang="ru-RU" baseline="0" dirty="0" smtClean="0"/>
-              <a:t>нал</a:t>
+              <a:t>он не должен вернуть нал</a:t>
             </a:r>
             <a:endParaRPr lang="ru-RU" dirty="0"/>
           </a:p>
@@ -26688,7 +26841,25 @@
                 </a:solidFill>
                 <a:latin typeface="Consolas" panose="020B0609020204030204" pitchFamily="49" charset="0"/>
               </a:rPr>
-              <a:t> depth=20) {</a:t>
+              <a:t> depth=</a:t>
+            </a:r>
+            <a:r>
+              <a:rPr lang="en-US" sz="2400" dirty="0" err="1" smtClean="0">
+                <a:solidFill>
+                  <a:srgbClr val="000000"/>
+                </a:solidFill>
+                <a:latin typeface="Consolas" panose="020B0609020204030204" pitchFamily="49" charset="0"/>
+              </a:rPr>
+              <a:t>MaxDepth</a:t>
+            </a:r>
+            <a:r>
+              <a:rPr lang="en-US" sz="2400" dirty="0" smtClean="0">
+                <a:solidFill>
+                  <a:srgbClr val="000000"/>
+                </a:solidFill>
+                <a:latin typeface="Consolas" panose="020B0609020204030204" pitchFamily="49" charset="0"/>
+              </a:rPr>
+              <a:t>) {</a:t>
             </a:r>
           </a:p>
           <a:p>
@@ -27231,7 +27402,7 @@
         <p:spPr>
           <a:xfrm>
             <a:off x="1331001" y="1393340"/>
-            <a:ext cx="11809312" cy="5183905"/>
+            <a:ext cx="9805559" cy="5183905"/>
           </a:xfrm>
         </p:spPr>
         <p:txBody>
@@ -27251,7 +27422,7 @@
             </a:pPr>
             <a:r>
               <a:rPr lang="ru-RU" dirty="0" smtClean="0"/>
-              <a:t>Низкоуровневое исключение</a:t>
+              <a:t>Возникает при некорректной работе с памятью</a:t>
             </a:r>
           </a:p>
           <a:p>
@@ -27260,39 +27431,63 @@
             </a:pPr>
             <a:r>
               <a:rPr lang="ru-RU" dirty="0" smtClean="0"/>
-              <a:t>Возникает </a:t>
+              <a:t>Ан</a:t>
             </a:r>
             <a:r>
               <a:rPr lang="ru-RU" dirty="0"/>
-              <a:t>при некорректной работе с </a:t>
+              <a:t>а</a:t>
             </a:r>
             <a:r>
               <a:rPr lang="ru-RU" dirty="0" smtClean="0"/>
-              <a:t>памятью</a:t>
-            </a:r>
-            <a:endParaRPr lang="en-US" dirty="0" smtClean="0">
-              <a:latin typeface="+mn-lt"/>
-            </a:endParaRPr>
+              <a:t>логично </a:t>
+            </a:r>
+            <a:r>
+              <a:rPr lang="en-US" dirty="0" err="1" smtClean="0"/>
+              <a:t>StackOverflow</a:t>
+            </a:r>
+            <a:r>
+              <a:rPr lang="en-US" dirty="0" smtClean="0"/>
+              <a:t> – </a:t>
+            </a:r>
+            <a:r>
+              <a:rPr lang="ru-RU" dirty="0" smtClean="0"/>
+              <a:t>поведение зависит от кода, выбросившего исключение</a:t>
+            </a:r>
           </a:p>
           <a:p>
             <a:pPr marL="514350" indent="-514350">
               <a:buAutoNum type="arabicPeriod"/>
             </a:pPr>
             <a:r>
-              <a:rPr lang="ru-RU" dirty="0" smtClean="0">
-                <a:latin typeface="+mn-lt"/>
-              </a:rPr>
-              <a:t>Ведёт себя аналогично </a:t>
+              <a:rPr lang="ru-RU" dirty="0" smtClean="0"/>
+              <a:t>Можно перехватить:</a:t>
+            </a:r>
+          </a:p>
+          <a:p>
+            <a:pPr lvl="1" indent="0">
+              <a:buNone/>
+            </a:pPr>
+            <a:r>
+              <a:rPr lang="en-US" dirty="0" smtClean="0">
+                <a:latin typeface="Consolas" panose="020B0609020204030204" pitchFamily="49" charset="0"/>
+              </a:rPr>
+              <a:t>[</a:t>
             </a:r>
             <a:r>
               <a:rPr lang="en-US" dirty="0" err="1" smtClean="0">
-                <a:latin typeface="+mn-lt"/>
-              </a:rPr>
-              <a:t>StackOverflowException</a:t>
-            </a:r>
-            <a:endParaRPr lang="en-US" dirty="0" smtClean="0">
-              <a:latin typeface="+mn-lt"/>
-            </a:endParaRPr>
+                <a:solidFill>
+                  <a:srgbClr val="2B91AF"/>
+                </a:solidFill>
+                <a:latin typeface="Consolas" panose="020B0609020204030204" pitchFamily="49" charset="0"/>
+              </a:rPr>
+              <a:t>HandleProcessCorruptedStateExceptions</a:t>
+            </a:r>
+            <a:r>
+              <a:rPr lang="en-US" dirty="0" smtClean="0">
+                <a:latin typeface="Consolas" panose="020B0609020204030204" pitchFamily="49" charset="0"/>
+              </a:rPr>
+              <a:t>]</a:t>
+            </a:r>
           </a:p>
         </p:txBody>
       </p:sp>
@@ -27744,7 +27939,7 @@
                             </p:stCondLst>
                             <p:childTnLst>
                               <p:par>
-                                <p:cTn id="5" presetID="1" presetClass="entr" presetSubtype="0" fill="hold" grpId="0" nodeType="clickEffect">
+                                <p:cTn id="5" presetID="1" presetClass="entr" presetSubtype="0" fill="hold" nodeType="clickEffect">
                                   <p:stCondLst>
                                     <p:cond delay="0"/>
                                   </p:stCondLst>
@@ -27774,33 +27969,15 @@
                                   </p:childTnLst>
                                 </p:cTn>
                               </p:par>
-                            </p:childTnLst>
-                          </p:cTn>
-                        </p:par>
-                      </p:childTnLst>
-                    </p:cTn>
-                  </p:par>
-                  <p:par>
-                    <p:cTn id="7" fill="hold">
-                      <p:stCondLst>
-                        <p:cond delay="indefinite"/>
-                      </p:stCondLst>
-                      <p:childTnLst>
-                        <p:par>
-                          <p:cTn id="8" fill="hold">
-                            <p:stCondLst>
-                              <p:cond delay="0"/>
-                            </p:stCondLst>
-                            <p:childTnLst>
                               <p:par>
-                                <p:cTn id="9" presetID="1" presetClass="entr" presetSubtype="0" fill="hold" grpId="0" nodeType="clickEffect">
+                                <p:cTn id="7" presetID="1" presetClass="entr" presetSubtype="0" fill="hold" nodeType="withEffect">
                                   <p:stCondLst>
                                     <p:cond delay="0"/>
                                   </p:stCondLst>
                                   <p:childTnLst>
                                     <p:set>
                                       <p:cBhvr>
-                                        <p:cTn id="10" dur="1" fill="hold">
+                                        <p:cTn id="8" dur="1" fill="hold">
                                           <p:stCondLst>
                                             <p:cond delay="0"/>
                                           </p:stCondLst>
@@ -27830,19 +28007,50 @@
                     </p:cTn>
                   </p:par>
                   <p:par>
-                    <p:cTn id="11" fill="hold">
+                    <p:cTn id="9" fill="hold">
                       <p:stCondLst>
                         <p:cond delay="indefinite"/>
                       </p:stCondLst>
                       <p:childTnLst>
                         <p:par>
-                          <p:cTn id="12" fill="hold">
+                          <p:cTn id="10" fill="hold">
                             <p:stCondLst>
                               <p:cond delay="0"/>
                             </p:stCondLst>
                             <p:childTnLst>
                               <p:par>
-                                <p:cTn id="13" presetID="1" presetClass="entr" presetSubtype="0" fill="hold" grpId="0" nodeType="clickEffect">
+                                <p:cTn id="11" presetID="1" presetClass="entr" presetSubtype="0" fill="hold" nodeType="clickEffect">
+                                  <p:stCondLst>
+                                    <p:cond delay="0"/>
+                                  </p:stCondLst>
+                                  <p:childTnLst>
+                                    <p:set>
+                                      <p:cBhvr>
+                                        <p:cTn id="12" dur="1" fill="hold">
+                                          <p:stCondLst>
+                                            <p:cond delay="0"/>
+                                          </p:stCondLst>
+                                        </p:cTn>
+                                        <p:tgtEl>
+                                          <p:spTgt spid="2">
+                                            <p:txEl>
+                                              <p:pRg st="3" end="3"/>
+                                            </p:txEl>
+                                          </p:spTgt>
+                                        </p:tgtEl>
+                                        <p:attrNameLst>
+                                          <p:attrName>style.visibility</p:attrName>
+                                        </p:attrNameLst>
+                                      </p:cBhvr>
+                                      <p:to>
+                                        <p:strVal val="visible"/>
+                                      </p:to>
+                                    </p:set>
+                                  </p:childTnLst>
+                                </p:cTn>
+                              </p:par>
+                              <p:par>
+                                <p:cTn id="13" presetID="1" presetClass="entr" presetSubtype="0" fill="hold" nodeType="withEffect">
                                   <p:stCondLst>
                                     <p:cond delay="0"/>
                                   </p:stCondLst>
@@ -27857,7 +28065,7 @@
                                         <p:tgtEl>
                                           <p:spTgt spid="2">
                                             <p:txEl>
-                                              <p:pRg st="3" end="3"/>
+                                              <p:pRg st="4" end="4"/>
                                             </p:txEl>
                                           </p:spTgt>
                                         </p:tgtEl>
@@ -27899,9 +28107,6 @@
         </p:cTn>
       </p:par>
     </p:tnLst>
-    <p:bldLst>
-      <p:bldP spid="2" grpId="0" build="p"/>
-    </p:bldLst>
   </p:timing>
 </p:sld>
 </file>
@@ -29839,13 +30044,10 @@
               <a:t>(</a:t>
             </a:r>
             <a:r>
-              <a:rPr lang="en-US" sz="2800" dirty="0">
-                <a:solidFill>
-                  <a:srgbClr val="A31515"/>
-                </a:solidFill>
-                <a:latin typeface="Consolas" panose="020B0609020204030204" pitchFamily="49" charset="0"/>
-              </a:rPr>
-              <a:t>"!"</a:t>
+              <a:rPr lang="en-US" sz="2800" dirty="0" smtClean="0">
+                <a:latin typeface="Consolas" panose="020B0609020204030204" pitchFamily="49" charset="0"/>
+              </a:rPr>
+              <a:t>e</a:t>
             </a:r>
             <a:r>
               <a:rPr lang="en-US" sz="2800" dirty="0" smtClean="0">
@@ -29875,7 +30077,58 @@
             </a:r>
           </a:p>
           <a:p>
-            <a:endParaRPr lang="ru-RU" dirty="0"/>
+            <a:r>
+              <a:rPr lang="en-US" sz="2800" dirty="0" err="1">
+                <a:solidFill>
+                  <a:srgbClr val="2B91AF"/>
+                </a:solidFill>
+                <a:latin typeface="Consolas" panose="020B0609020204030204" pitchFamily="49" charset="0"/>
+              </a:rPr>
+              <a:t>Console</a:t>
+            </a:r>
+            <a:r>
+              <a:rPr lang="en-US" sz="2800" dirty="0" err="1">
+                <a:solidFill>
+                  <a:srgbClr val="000000"/>
+                </a:solidFill>
+                <a:latin typeface="Consolas" panose="020B0609020204030204" pitchFamily="49" charset="0"/>
+              </a:rPr>
+              <a:t>.</a:t>
+            </a:r>
+            <a:r>
+              <a:rPr lang="en-US" sz="2800" dirty="0" err="1">
+                <a:latin typeface="Consolas" panose="020B0609020204030204" pitchFamily="49" charset="0"/>
+              </a:rPr>
+              <a:t>WriteLine</a:t>
+            </a:r>
+            <a:r>
+              <a:rPr lang="en-US" sz="2800" dirty="0">
+                <a:solidFill>
+                  <a:srgbClr val="000000"/>
+                </a:solidFill>
+                <a:latin typeface="Consolas" panose="020B0609020204030204" pitchFamily="49" charset="0"/>
+              </a:rPr>
+              <a:t>(</a:t>
+            </a:r>
+            <a:r>
+              <a:rPr lang="en-US" sz="2800" dirty="0">
+                <a:solidFill>
+                  <a:srgbClr val="A31515"/>
+                </a:solidFill>
+                <a:latin typeface="Consolas" panose="020B0609020204030204" pitchFamily="49" charset="0"/>
+              </a:rPr>
+              <a:t>"!"</a:t>
+            </a:r>
+            <a:r>
+              <a:rPr lang="en-US" sz="2800" dirty="0">
+                <a:solidFill>
+                  <a:srgbClr val="000000"/>
+                </a:solidFill>
+                <a:latin typeface="Consolas" panose="020B0609020204030204" pitchFamily="49" charset="0"/>
+              </a:rPr>
+              <a:t>);</a:t>
+            </a:r>
+            <a:endParaRPr lang="ru-RU" sz="2800" dirty="0"/>
           </a:p>
         </p:txBody>
       </p:sp>
@@ -30188,10 +30441,16 @@
               <a:buAutoNum type="arabicPeriod"/>
             </a:pPr>
             <a:r>
-              <a:rPr lang="ru-RU" dirty="0" smtClean="0">
-                <a:latin typeface="+mn-lt"/>
-              </a:rPr>
-              <a:t>Исключение обработается, но вылетит снова</a:t>
+              <a:rPr lang="ru-RU" dirty="0"/>
+              <a:t>Зайдём в </a:t>
+            </a:r>
+            <a:r>
+              <a:rPr lang="en-US" dirty="0"/>
+              <a:t>catch</a:t>
+            </a:r>
+            <a:r>
+              <a:rPr lang="ru-RU" dirty="0"/>
+              <a:t>, но исключение вылетит снова</a:t>
             </a:r>
           </a:p>
           <a:p>
@@ -30199,20 +30458,22 @@
               <a:buAutoNum type="arabicPeriod"/>
             </a:pPr>
             <a:r>
-              <a:rPr lang="ru-RU" dirty="0" smtClean="0">
-                <a:latin typeface="+mn-lt"/>
-              </a:rPr>
-              <a:t>Исключение обработается, но вылетит </a:t>
-            </a:r>
-            <a:r>
-              <a:rPr lang="en-US" dirty="0" err="1" smtClean="0">
-                <a:latin typeface="+mn-lt"/>
-              </a:rPr>
+              <a:rPr lang="ru-RU" dirty="0"/>
+              <a:t>Зайдём в </a:t>
+            </a:r>
+            <a:r>
+              <a:rPr lang="en-US" dirty="0"/>
+              <a:t>catch</a:t>
+            </a:r>
+            <a:r>
+              <a:rPr lang="ru-RU" dirty="0"/>
+              <a:t>, но вылетит </a:t>
+            </a:r>
+            <a:r>
+              <a:rPr lang="en-US" dirty="0" err="1"/>
               <a:t>StackOverflow</a:t>
             </a:r>
-            <a:endParaRPr lang="ru-RU" dirty="0" smtClean="0">
-              <a:latin typeface="+mn-lt"/>
-            </a:endParaRPr>
+            <a:endParaRPr lang="en-US" dirty="0"/>
           </a:p>
         </p:txBody>
       </p:sp>
@@ -33262,15 +33523,7 @@
                   <a:srgbClr val="008000"/>
                 </a:solidFill>
               </a:rPr>
-              <a:t>сключение </a:t>
-            </a:r>
-            <a:r>
-              <a:rPr lang="ru-RU" dirty="0">
-                <a:solidFill>
-                  <a:srgbClr val="008000"/>
-                </a:solidFill>
-              </a:rPr>
-              <a:t>обработается</a:t>
+              <a:t>сключение обработается</a:t>
             </a:r>
             <a:endParaRPr lang="ru-RU" dirty="0" smtClean="0">
               <a:solidFill>
@@ -33290,7 +33543,25 @@
                 </a:solidFill>
                 <a:latin typeface="+mn-lt"/>
               </a:rPr>
-              <a:t>Исключение обработается, но вылетит снова</a:t>
+              <a:t>Зайдём в </a:t>
+            </a:r>
+            <a:r>
+              <a:rPr lang="en-US" dirty="0" smtClean="0">
+                <a:solidFill>
+                  <a:srgbClr val="008000"/>
+                </a:solidFill>
+                <a:latin typeface="+mn-lt"/>
+              </a:rPr>
+              <a:t>catch</a:t>
+            </a:r>
+            <a:r>
+              <a:rPr lang="ru-RU" dirty="0" smtClean="0">
+                <a:solidFill>
+                  <a:srgbClr val="008000"/>
+                </a:solidFill>
+                <a:latin typeface="+mn-lt"/>
+              </a:rPr>
+              <a:t>, но исключение вылетит снова</a:t>
             </a:r>
           </a:p>
           <a:p>
@@ -33304,7 +33575,25 @@
                 </a:solidFill>
                 <a:latin typeface="+mn-lt"/>
               </a:rPr>
-              <a:t>Исключение обработается, но вылетит </a:t>
+              <a:t>Зайдём в </a:t>
+            </a:r>
+            <a:r>
+              <a:rPr lang="en-US" dirty="0" smtClean="0">
+                <a:solidFill>
+                  <a:srgbClr val="008000"/>
+                </a:solidFill>
+                <a:latin typeface="+mn-lt"/>
+              </a:rPr>
+              <a:t>catch</a:t>
+            </a:r>
+            <a:r>
+              <a:rPr lang="ru-RU" dirty="0" smtClean="0">
+                <a:solidFill>
+                  <a:srgbClr val="008000"/>
+                </a:solidFill>
+                <a:latin typeface="+mn-lt"/>
+              </a:rPr>
+              <a:t>, но вылетит </a:t>
             </a:r>
             <a:r>
               <a:rPr lang="en-US" dirty="0" err="1" smtClean="0">
@@ -33315,10 +33604,11 @@
               </a:rPr>
               <a:t>StackOverflow</a:t>
             </a:r>
-            <a:endParaRPr lang="ru-RU" dirty="0" smtClean="0">
+            <a:endParaRPr lang="en-US" dirty="0" smtClean="0">
               <a:solidFill>
                 <a:srgbClr val="008000"/>
               </a:solidFill>
+              <a:latin typeface="+mn-lt"/>
             </a:endParaRPr>
           </a:p>
           <a:p>
@@ -33923,6 +34213,29 @@
           </a:p>
         </p:txBody>
       </p:sp>
+      <p:pic>
+        <p:nvPicPr>
+          <p:cNvPr id="10" name="Рисунок 9"/>
+          <p:cNvPicPr>
+            <a:picLocks noChangeAspect="1"/>
+          </p:cNvPicPr>
+          <p:nvPr/>
+        </p:nvPicPr>
+        <p:blipFill rotWithShape="1">
+          <a:blip r:embed="rId3"/>
+          <a:srcRect b="27975"/>
+          <a:stretch/>
+        </p:blipFill>
+        <p:spPr>
+          <a:xfrm>
+            <a:off x="2309156" y="4817989"/>
+            <a:ext cx="7573692" cy="2003863"/>
+          </a:xfrm>
+          <a:prstGeom prst="rect">
+            <a:avLst/>
+          </a:prstGeom>
+        </p:spPr>
+      </p:pic>
     </p:spTree>
     <p:extLst>
       <p:ext uri="{BB962C8B-B14F-4D97-AF65-F5344CB8AC3E}">
@@ -33986,6 +34299,51 @@
                       </p:childTnLst>
                     </p:cTn>
                   </p:par>
+                  <p:par>
+                    <p:cTn id="7" fill="hold">
+                      <p:stCondLst>
+                        <p:cond delay="indefinite"/>
+                      </p:stCondLst>
+                      <p:childTnLst>
+                        <p:par>
+                          <p:cTn id="8" fill="hold">
+                            <p:stCondLst>
+                              <p:cond delay="0"/>
+                            </p:stCondLst>
+                            <p:childTnLst>
+                              <p:par>
+                                <p:cTn id="9" presetID="1" presetClass="entr" presetSubtype="0" fill="hold" nodeType="clickEffect">
+                                  <p:stCondLst>
+                                    <p:cond delay="0"/>
+                                  </p:stCondLst>
+                                  <p:childTnLst>
+                                    <p:set>
+                                      <p:cBhvr>
+                                        <p:cTn id="10" dur="1" fill="hold">
+                                          <p:stCondLst>
+                                            <p:cond delay="0"/>
+                                          </p:stCondLst>
+                                        </p:cTn>
+                                        <p:tgtEl>
+                                          <p:spTgt spid="10"/>
+                                        </p:tgtEl>
+                                        <p:attrNameLst>
+                                          <p:attrName>style.visibility</p:attrName>
+                                        </p:attrNameLst>
+                                      </p:cBhvr>
+                                      <p:to>
+                                        <p:strVal val="visible"/>
+                                      </p:to>
+                                    </p:set>
+                                  </p:childTnLst>
+                                </p:cTn>
+                              </p:par>
+                            </p:childTnLst>
+                          </p:cTn>
+                        </p:par>
+                      </p:childTnLst>
+                    </p:cTn>
+                  </p:par>
                 </p:childTnLst>
               </p:cTn>
               <p:prevCondLst>
@@ -34031,6 +34389,264 @@
           <a:chExt cx="0" cy="0"/>
         </a:xfrm>
       </p:grpSpPr>
+      <p:pic>
+        <p:nvPicPr>
+          <p:cNvPr id="9" name="Рисунок 8"/>
+          <p:cNvPicPr>
+            <a:picLocks noChangeAspect="1"/>
+          </p:cNvPicPr>
+          <p:nvPr/>
+        </p:nvPicPr>
+        <p:blipFill>
+          <a:blip r:embed="rId3"/>
+          <a:stretch>
+            <a:fillRect/>
+          </a:stretch>
+        </p:blipFill>
+        <p:spPr>
+          <a:xfrm>
+            <a:off x="695400" y="1196752"/>
+            <a:ext cx="11261965" cy="5400600"/>
+          </a:xfrm>
+          <a:prstGeom prst="rect">
+            <a:avLst/>
+          </a:prstGeom>
+        </p:spPr>
+      </p:pic>
+      <p:sp>
+        <p:nvSpPr>
+          <p:cNvPr id="3" name="Заголовок 2"/>
+          <p:cNvSpPr>
+            <a:spLocks noGrp="1"/>
+          </p:cNvSpPr>
+          <p:nvPr>
+            <p:ph type="title"/>
+          </p:nvPr>
+        </p:nvSpPr>
+        <p:spPr/>
+        <p:txBody>
+          <a:bodyPr/>
+          <a:lstStyle/>
+          <a:p>
+            <a:r>
+              <a:rPr lang="ru-RU" dirty="0" smtClean="0"/>
+              <a:t>Откуда </a:t>
+            </a:r>
+            <a:r>
+              <a:rPr lang="en-US" dirty="0" err="1" smtClean="0"/>
+              <a:t>stackoverflow</a:t>
+            </a:r>
+            <a:endParaRPr lang="ru-RU" dirty="0"/>
+          </a:p>
+        </p:txBody>
+      </p:sp>
+      <p:sp>
+        <p:nvSpPr>
+          <p:cNvPr id="5" name="TextBox 4"/>
+          <p:cNvSpPr txBox="1"/>
+          <p:nvPr/>
+        </p:nvSpPr>
+        <p:spPr>
+          <a:xfrm>
+            <a:off x="4079776" y="3284984"/>
+            <a:ext cx="8280921" cy="1754326"/>
+          </a:xfrm>
+          <a:prstGeom prst="rect">
+            <a:avLst/>
+          </a:prstGeom>
+          <a:noFill/>
+        </p:spPr>
+        <p:txBody>
+          <a:bodyPr wrap="square" rtlCol="0">
+            <a:spAutoFit/>
+          </a:bodyPr>
+          <a:lstStyle/>
+          <a:p>
+            <a:r>
+              <a:rPr lang="ru-RU" sz="3600" dirty="0" smtClean="0"/>
+              <a:t>«</a:t>
+            </a:r>
+            <a:r>
+              <a:rPr lang="en-US" sz="3600" dirty="0" smtClean="0"/>
+              <a:t>The </a:t>
+            </a:r>
+            <a:r>
+              <a:rPr lang="en-US" sz="3600" dirty="0"/>
+              <a:t>default behavior of the </a:t>
+            </a:r>
+            <a:r>
+              <a:rPr lang="en-US" sz="3600" dirty="0" smtClean="0"/>
+              <a:t>CLR is </a:t>
+            </a:r>
+            <a:r>
+              <a:rPr lang="en-US" sz="3600" dirty="0"/>
+              <a:t>to commit the full thread stack when a thread is started</a:t>
+            </a:r>
+            <a:r>
+              <a:rPr lang="en-US" sz="3600" dirty="0" smtClean="0"/>
+              <a:t>.</a:t>
+            </a:r>
+            <a:r>
+              <a:rPr lang="ru-RU" sz="3600" dirty="0" smtClean="0"/>
+              <a:t>»</a:t>
+            </a:r>
+            <a:endParaRPr lang="ru-RU" sz="3600" dirty="0"/>
+          </a:p>
+        </p:txBody>
+      </p:sp>
+    </p:spTree>
+    <p:extLst>
+      <p:ext uri="{BB962C8B-B14F-4D97-AF65-F5344CB8AC3E}">
+        <p14:creationId xmlns:p14="http://schemas.microsoft.com/office/powerpoint/2010/main" val="718412253"/>
+      </p:ext>
+    </p:extLst>
+  </p:cSld>
+  <p:clrMapOvr>
+    <a:masterClrMapping/>
+  </p:clrMapOvr>
+  <p:timing>
+    <p:tnLst>
+      <p:par>
+        <p:cTn id="1" dur="indefinite" restart="never" nodeType="tmRoot">
+          <p:childTnLst>
+            <p:seq concurrent="1" nextAc="seek">
+              <p:cTn id="2" dur="indefinite" nodeType="mainSeq">
+                <p:childTnLst>
+                  <p:par>
+                    <p:cTn id="3" fill="hold">
+                      <p:stCondLst>
+                        <p:cond delay="indefinite"/>
+                      </p:stCondLst>
+                      <p:childTnLst>
+                        <p:par>
+                          <p:cTn id="4" fill="hold">
+                            <p:stCondLst>
+                              <p:cond delay="0"/>
+                            </p:stCondLst>
+                            <p:childTnLst>
+                              <p:par>
+                                <p:cTn id="5" presetID="1" presetClass="entr" presetSubtype="0" fill="hold" nodeType="clickEffect">
+                                  <p:stCondLst>
+                                    <p:cond delay="0"/>
+                                  </p:stCondLst>
+                                  <p:childTnLst>
+                                    <p:set>
+                                      <p:cBhvr>
+                                        <p:cTn id="6" dur="1" fill="hold">
+                                          <p:stCondLst>
+                                            <p:cond delay="0"/>
+                                          </p:stCondLst>
+                                        </p:cTn>
+                                        <p:tgtEl>
+                                          <p:spTgt spid="9"/>
+                                        </p:tgtEl>
+                                        <p:attrNameLst>
+                                          <p:attrName>style.visibility</p:attrName>
+                                        </p:attrNameLst>
+                                      </p:cBhvr>
+                                      <p:to>
+                                        <p:strVal val="visible"/>
+                                      </p:to>
+                                    </p:set>
+                                  </p:childTnLst>
+                                </p:cTn>
+                              </p:par>
+                            </p:childTnLst>
+                          </p:cTn>
+                        </p:par>
+                      </p:childTnLst>
+                    </p:cTn>
+                  </p:par>
+                  <p:par>
+                    <p:cTn id="7" fill="hold">
+                      <p:stCondLst>
+                        <p:cond delay="indefinite"/>
+                      </p:stCondLst>
+                      <p:childTnLst>
+                        <p:par>
+                          <p:cTn id="8" fill="hold">
+                            <p:stCondLst>
+                              <p:cond delay="0"/>
+                            </p:stCondLst>
+                            <p:childTnLst>
+                              <p:par>
+                                <p:cTn id="9" presetID="1" presetClass="entr" presetSubtype="0" fill="hold" grpId="0" nodeType="clickEffect">
+                                  <p:stCondLst>
+                                    <p:cond delay="0"/>
+                                  </p:stCondLst>
+                                  <p:childTnLst>
+                                    <p:set>
+                                      <p:cBhvr>
+                                        <p:cTn id="10" dur="1" fill="hold">
+                                          <p:stCondLst>
+                                            <p:cond delay="0"/>
+                                          </p:stCondLst>
+                                        </p:cTn>
+                                        <p:tgtEl>
+                                          <p:spTgt spid="5"/>
+                                        </p:tgtEl>
+                                        <p:attrNameLst>
+                                          <p:attrName>style.visibility</p:attrName>
+                                        </p:attrNameLst>
+                                      </p:cBhvr>
+                                      <p:to>
+                                        <p:strVal val="visible"/>
+                                      </p:to>
+                                    </p:set>
+                                  </p:childTnLst>
+                                </p:cTn>
+                              </p:par>
+                            </p:childTnLst>
+                          </p:cTn>
+                        </p:par>
+                      </p:childTnLst>
+                    </p:cTn>
+                  </p:par>
+                </p:childTnLst>
+              </p:cTn>
+              <p:prevCondLst>
+                <p:cond evt="onPrev" delay="0">
+                  <p:tgtEl>
+                    <p:sldTgt/>
+                  </p:tgtEl>
+                </p:cond>
+              </p:prevCondLst>
+              <p:nextCondLst>
+                <p:cond evt="onNext" delay="0">
+                  <p:tgtEl>
+                    <p:sldTgt/>
+                  </p:tgtEl>
+                </p:cond>
+              </p:nextCondLst>
+            </p:seq>
+          </p:childTnLst>
+        </p:cTn>
+      </p:par>
+    </p:tnLst>
+    <p:bldLst>
+      <p:bldP spid="5" grpId="0"/>
+    </p:bldLst>
+  </p:timing>
+</p:sld>
+</file>
+
+<file path=ppt/slides/slide42.xml><?xml version="1.0" encoding="utf-8"?>
+<p:sld xmlns:a="http://schemas.openxmlformats.org/drawingml/2006/main" xmlns:r="http://schemas.openxmlformats.org/officeDocument/2006/relationships" xmlns:p="http://schemas.openxmlformats.org/presentationml/2006/main">
+  <p:cSld>
+    <p:spTree>
+      <p:nvGrpSpPr>
+        <p:cNvPr id="1" name=""/>
+        <p:cNvGrpSpPr/>
+        <p:nvPr/>
+      </p:nvGrpSpPr>
+      <p:grpSpPr>
+        <a:xfrm>
+          <a:off x="0" y="0"/>
+          <a:ext cx="0" cy="0"/>
+          <a:chOff x="0" y="0"/>
+          <a:chExt cx="0" cy="0"/>
+        </a:xfrm>
+      </p:grpSpPr>
       <p:sp>
         <p:nvSpPr>
           <p:cNvPr id="2" name="Объект 1"/>
@@ -34427,7 +35043,7 @@
 </p:sld>
 </file>
 
-<file path=ppt/slides/slide42.xml><?xml version="1.0" encoding="utf-8"?>
+<file path=ppt/slides/slide43.xml><?xml version="1.0" encoding="utf-8"?>
 <p:sld xmlns:a="http://schemas.openxmlformats.org/drawingml/2006/main" xmlns:r="http://schemas.openxmlformats.org/officeDocument/2006/relationships" xmlns:p="http://schemas.openxmlformats.org/presentationml/2006/main">
   <p:cSld>
     <p:spTree>

</xml_diff>

<commit_message>
fix formatting on slide
</commit_message>
<xml_diff>
--- a/exceptions.pptx
+++ b/exceptions.pptx
@@ -16337,6 +16337,13 @@
   <p:clrMapOvr>
     <a:masterClrMapping/>
   </p:clrMapOvr>
+  <p:timing>
+    <p:tnLst>
+      <p:par>
+        <p:cTn id="1" dur="indefinite" restart="never" nodeType="tmRoot"/>
+      </p:par>
+    </p:tnLst>
+  </p:timing>
 </p:sld>
 </file>
 
@@ -17858,6 +17865,13 @@
   <p:clrMapOvr>
     <a:masterClrMapping/>
   </p:clrMapOvr>
+  <p:timing>
+    <p:tnLst>
+      <p:par>
+        <p:cTn id="1" dur="indefinite" restart="never" nodeType="tmRoot"/>
+      </p:par>
+    </p:tnLst>
+  </p:timing>
 </p:sld>
 </file>
 
@@ -17915,6 +17929,13 @@
   <p:clrMapOvr>
     <a:masterClrMapping/>
   </p:clrMapOvr>
+  <p:timing>
+    <p:tnLst>
+      <p:par>
+        <p:cTn id="1" dur="indefinite" restart="never" nodeType="tmRoot"/>
+      </p:par>
+    </p:tnLst>
+  </p:timing>
 </p:sld>
 </file>
 
@@ -18384,6 +18405,13 @@
   <p:clrMapOvr>
     <a:masterClrMapping/>
   </p:clrMapOvr>
+  <p:timing>
+    <p:tnLst>
+      <p:par>
+        <p:cTn id="1" dur="indefinite" restart="never" nodeType="tmRoot"/>
+      </p:par>
+    </p:tnLst>
+  </p:timing>
 </p:sld>
 </file>
 
@@ -18733,6 +18761,13 @@
   <p:clrMapOvr>
     <a:masterClrMapping/>
   </p:clrMapOvr>
+  <p:timing>
+    <p:tnLst>
+      <p:par>
+        <p:cTn id="1" dur="indefinite" restart="never" nodeType="tmRoot"/>
+      </p:par>
+    </p:tnLst>
+  </p:timing>
 </p:sld>
 </file>
 
@@ -19182,6 +19217,13 @@
   <p:clrMapOvr>
     <a:masterClrMapping/>
   </p:clrMapOvr>
+  <p:timing>
+    <p:tnLst>
+      <p:par>
+        <p:cTn id="1" dur="indefinite" restart="never" nodeType="tmRoot"/>
+      </p:par>
+    </p:tnLst>
+  </p:timing>
 </p:sld>
 </file>
 
@@ -19594,6 +19636,13 @@
   <p:clrMapOvr>
     <a:masterClrMapping/>
   </p:clrMapOvr>
+  <p:timing>
+    <p:tnLst>
+      <p:par>
+        <p:cTn id="1" dur="indefinite" restart="never" nodeType="tmRoot"/>
+      </p:par>
+    </p:tnLst>
+  </p:timing>
 </p:sld>
 </file>
 
@@ -19912,6 +19961,13 @@
   <p:clrMapOvr>
     <a:masterClrMapping/>
   </p:clrMapOvr>
+  <p:timing>
+    <p:tnLst>
+      <p:par>
+        <p:cTn id="1" dur="indefinite" restart="never" nodeType="tmRoot"/>
+      </p:par>
+    </p:tnLst>
+  </p:timing>
 </p:sld>
 </file>
 
@@ -20065,7 +20121,7 @@
         </p:nvSpPr>
         <p:spPr>
           <a:xfrm>
-            <a:off x="1331001" y="677377"/>
+            <a:off x="1331001" y="549276"/>
             <a:ext cx="9601067" cy="792163"/>
           </a:xfrm>
         </p:spPr>
@@ -20946,6 +21002,13 @@
   <p:clrMapOvr>
     <a:masterClrMapping/>
   </p:clrMapOvr>
+  <p:timing>
+    <p:tnLst>
+      <p:par>
+        <p:cTn id="1" dur="indefinite" restart="never" nodeType="tmRoot"/>
+      </p:par>
+    </p:tnLst>
+  </p:timing>
 </p:sld>
 </file>
 
@@ -21640,6 +21703,13 @@
   <p:clrMapOvr>
     <a:masterClrMapping/>
   </p:clrMapOvr>
+  <p:timing>
+    <p:tnLst>
+      <p:par>
+        <p:cTn id="1" dur="indefinite" restart="never" nodeType="tmRoot"/>
+      </p:par>
+    </p:tnLst>
+  </p:timing>
 </p:sld>
 </file>
 
@@ -22373,6 +22443,13 @@
   <p:clrMapOvr>
     <a:masterClrMapping/>
   </p:clrMapOvr>
+  <p:timing>
+    <p:tnLst>
+      <p:par>
+        <p:cTn id="1" dur="indefinite" restart="never" nodeType="tmRoot"/>
+      </p:par>
+    </p:tnLst>
+  </p:timing>
 </p:sld>
 </file>
 
@@ -22476,6 +22553,13 @@
   <p:clrMapOvr>
     <a:masterClrMapping/>
   </p:clrMapOvr>
+  <p:timing>
+    <p:tnLst>
+      <p:par>
+        <p:cTn id="1" dur="indefinite" restart="never" nodeType="tmRoot"/>
+      </p:par>
+    </p:tnLst>
+  </p:timing>
 </p:sld>
 </file>
 
@@ -27149,6 +27233,13 @@
   <p:clrMapOvr>
     <a:masterClrMapping/>
   </p:clrMapOvr>
+  <p:timing>
+    <p:tnLst>
+      <p:par>
+        <p:cTn id="1" dur="indefinite" restart="never" nodeType="tmRoot"/>
+      </p:par>
+    </p:tnLst>
+  </p:timing>
 </p:sld>
 </file>
 
@@ -29056,11 +29147,7 @@
             </a:r>
             <a:r>
               <a:rPr lang="ru-RU" sz="2400" dirty="0" smtClean="0"/>
-              <a:t>)</a:t>
-            </a:r>
-            <a:r>
-              <a:rPr lang="ru-RU" sz="2400" dirty="0" smtClean="0"/>
-              <a:t>:</a:t>
+              <a:t>):</a:t>
             </a:r>
             <a:endParaRPr lang="ru-RU" sz="2400" dirty="0"/>
           </a:p>
@@ -33414,6 +33501,13 @@
   <p:clrMapOvr>
     <a:masterClrMapping/>
   </p:clrMapOvr>
+  <p:timing>
+    <p:tnLst>
+      <p:par>
+        <p:cTn id="1" dur="indefinite" restart="never" nodeType="tmRoot"/>
+      </p:par>
+    </p:tnLst>
+  </p:timing>
 </p:sld>
 </file>
 
@@ -35132,7 +35226,7 @@
                 <a14:useLocalDpi xmlns:a14="http://schemas.microsoft.com/office/drawing/2010/main" val="0"/>
               </a:ext>
               <a:ext uri="{96DAC541-7B7A-43D3-8B79-37D633B846F1}">
-                <asvg:svgBlip xmlns:asvg="http://schemas.microsoft.com/office/drawing/2016/SVG/main" xmlns="" r:embed="rId4"/>
+                <asvg:svgBlip xmlns="" xmlns:asvg="http://schemas.microsoft.com/office/drawing/2016/SVG/main" r:embed="rId4"/>
               </a:ext>
             </a:extLst>
           </a:blip>
@@ -36595,6 +36689,13 @@
   <p:clrMapOvr>
     <a:masterClrMapping/>
   </p:clrMapOvr>
+  <p:timing>
+    <p:tnLst>
+      <p:par>
+        <p:cTn id="1" dur="indefinite" restart="never" nodeType="tmRoot"/>
+      </p:par>
+    </p:tnLst>
+  </p:timing>
 </p:sld>
 </file>
 
@@ -37981,6 +38082,13 @@
   <p:clrMapOvr>
     <a:masterClrMapping/>
   </p:clrMapOvr>
+  <p:timing>
+    <p:tnLst>
+      <p:par>
+        <p:cTn id="1" dur="indefinite" restart="never" nodeType="tmRoot"/>
+      </p:par>
+    </p:tnLst>
+  </p:timing>
 </p:sld>
 </file>
 
@@ -38153,11 +38261,7 @@
             </a:r>
             <a:r>
               <a:rPr lang="en-US" sz="3200" cap="none" dirty="0" err="1" smtClean="0"/>
-              <a:t>N</a:t>
-            </a:r>
-            <a:r>
-              <a:rPr lang="en-US" sz="3200" cap="none" dirty="0" err="1" smtClean="0"/>
-              <a:t>ullReferenceException</a:t>
+              <a:t>NullReferenceException</a:t>
             </a:r>
             <a:r>
               <a:rPr lang="ru-RU" sz="3200" cap="none" dirty="0" smtClean="0"/>
@@ -38177,6 +38281,13 @@
   <p:clrMapOvr>
     <a:masterClrMapping/>
   </p:clrMapOvr>
+  <p:timing>
+    <p:tnLst>
+      <p:par>
+        <p:cTn id="1" dur="indefinite" restart="never" nodeType="tmRoot"/>
+      </p:par>
+    </p:tnLst>
+  </p:timing>
 </p:sld>
 </file>
 
@@ -38929,6 +39040,13 @@
   <p:clrMapOvr>
     <a:masterClrMapping/>
   </p:clrMapOvr>
+  <p:timing>
+    <p:tnLst>
+      <p:par>
+        <p:cTn id="1" dur="indefinite" restart="never" nodeType="tmRoot"/>
+      </p:par>
+    </p:tnLst>
+  </p:timing>
 </p:sld>
 </file>
 

</xml_diff>